<commit_message>
update presentations for part 1 and 2.
</commit_message>
<xml_diff>
--- a/part2.pptx
+++ b/part2.pptx
@@ -5,12 +5,20 @@
     <p:sldMasterId id="2147483712" r:id="rId4"/>
   </p:sldMasterIdLst>
   <p:notesMasterIdLst>
-    <p:notesMasterId r:id="rId8"/>
+    <p:notesMasterId r:id="rId16"/>
   </p:notesMasterIdLst>
   <p:sldIdLst>
     <p:sldId id="270" r:id="rId5"/>
     <p:sldId id="269" r:id="rId6"/>
     <p:sldId id="280" r:id="rId7"/>
+    <p:sldId id="281" r:id="rId8"/>
+    <p:sldId id="282" r:id="rId9"/>
+    <p:sldId id="283" r:id="rId10"/>
+    <p:sldId id="284" r:id="rId11"/>
+    <p:sldId id="285" r:id="rId12"/>
+    <p:sldId id="286" r:id="rId13"/>
+    <p:sldId id="287" r:id="rId14"/>
+    <p:sldId id="288" r:id="rId15"/>
   </p:sldIdLst>
   <p:sldSz cx="12192000" cy="6858000"/>
   <p:notesSz cx="6858000" cy="9144000"/>
@@ -120,6 +128,14 @@
             <p14:sldId id="270"/>
             <p14:sldId id="269"/>
             <p14:sldId id="280"/>
+            <p14:sldId id="281"/>
+            <p14:sldId id="282"/>
+            <p14:sldId id="283"/>
+            <p14:sldId id="284"/>
+            <p14:sldId id="285"/>
+            <p14:sldId id="286"/>
+            <p14:sldId id="287"/>
+            <p14:sldId id="288"/>
           </p14:sldIdLst>
         </p14:section>
       </p14:sectionLst>
@@ -213,7 +229,7 @@
           <a:p>
             <a:fld id="{23954472-26B8-44E5-A401-1B56A986C962}" type="datetimeFigureOut">
               <a:rPr lang="en-US" smtClean="0"/>
-              <a:t>6/9/2025</a:t>
+              <a:t>6/17/2025</a:t>
             </a:fld>
             <a:endParaRPr lang="en-US"/>
           </a:p>
@@ -718,7 +734,7 @@
           <a:p>
             <a:fld id="{ABBE8A07-D867-43E3-9957-FE25287FDE7F}" type="datetime1">
               <a:rPr lang="en-US" smtClean="0"/>
-              <a:t>6/9/2025</a:t>
+              <a:t>6/17/2025</a:t>
             </a:fld>
             <a:endParaRPr lang="en-US" dirty="0"/>
           </a:p>
@@ -925,7 +941,7 @@
           <a:p>
             <a:fld id="{6F48FDB9-5E87-415F-8144-004C6D344A0D}" type="datetime1">
               <a:rPr lang="en-US" smtClean="0"/>
-              <a:t>6/9/2025</a:t>
+              <a:t>6/17/2025</a:t>
             </a:fld>
             <a:endParaRPr lang="en-US" dirty="0"/>
           </a:p>
@@ -1291,7 +1307,7 @@
           <a:p>
             <a:fld id="{CAABBEED-8D2D-489E-950D-DBD5F84F1390}" type="datetime1">
               <a:rPr lang="en-US" smtClean="0"/>
-              <a:t>6/9/2025</a:t>
+              <a:t>6/17/2025</a:t>
             </a:fld>
             <a:endParaRPr lang="en-US" dirty="0"/>
           </a:p>
@@ -1493,7 +1509,7 @@
           <a:p>
             <a:fld id="{CF88291A-8565-4D13-A052-22B8FD849ADC}" type="datetime1">
               <a:rPr lang="en-US" smtClean="0"/>
-              <a:t>6/9/2025</a:t>
+              <a:t>6/17/2025</a:t>
             </a:fld>
             <a:endParaRPr lang="en-US" dirty="0"/>
           </a:p>
@@ -1809,7 +1825,7 @@
           <a:p>
             <a:fld id="{3E852A10-3379-42B8-BF26-A1DAC98F6123}" type="datetime1">
               <a:rPr lang="en-US" smtClean="0"/>
-              <a:t>6/9/2025</a:t>
+              <a:t>6/17/2025</a:t>
             </a:fld>
             <a:endParaRPr lang="en-US" dirty="0"/>
           </a:p>
@@ -2066,7 +2082,7 @@
           <a:p>
             <a:fld id="{1D541F83-E0E8-474A-8309-D58572E4138F}" type="datetime1">
               <a:rPr lang="en-US" smtClean="0"/>
-              <a:t>6/9/2025</a:t>
+              <a:t>6/17/2025</a:t>
             </a:fld>
             <a:endParaRPr lang="en-US" dirty="0"/>
           </a:p>
@@ -2492,7 +2508,7 @@
           <a:p>
             <a:fld id="{C3D682BE-4A37-403D-A24B-A32047C64FBE}" type="datetime1">
               <a:rPr lang="en-US" smtClean="0"/>
-              <a:t>6/9/2025</a:t>
+              <a:t>6/17/2025</a:t>
             </a:fld>
             <a:endParaRPr lang="en-US" dirty="0"/>
           </a:p>
@@ -2619,7 +2635,7 @@
           <a:p>
             <a:fld id="{D68DC366-CE4A-44E0-8FCF-7BBD793606F2}" type="datetime1">
               <a:rPr lang="en-US" smtClean="0"/>
-              <a:t>6/9/2025</a:t>
+              <a:t>6/17/2025</a:t>
             </a:fld>
             <a:endParaRPr lang="en-US" dirty="0"/>
           </a:p>
@@ -2718,7 +2734,7 @@
           <a:p>
             <a:fld id="{2232E3CD-03A6-4318-B55D-50B3C7E2786B}" type="datetime1">
               <a:rPr lang="en-US" smtClean="0"/>
-              <a:t>6/9/2025</a:t>
+              <a:t>6/17/2025</a:t>
             </a:fld>
             <a:endParaRPr lang="en-US" dirty="0"/>
           </a:p>
@@ -3099,7 +3115,7 @@
           <a:p>
             <a:fld id="{0AD1789E-A418-4A7D-BD4E-66041EFA1856}" type="datetime1">
               <a:rPr lang="en-US" smtClean="0"/>
-              <a:t>6/9/2025</a:t>
+              <a:t>6/17/2025</a:t>
             </a:fld>
             <a:endParaRPr lang="en-US" dirty="0"/>
           </a:p>
@@ -3396,7 +3412,7 @@
           <a:p>
             <a:fld id="{54AF2428-99E2-4130-9C98-BBE8598E28C9}" type="datetime1">
               <a:rPr lang="en-US" smtClean="0"/>
-              <a:t>6/9/2025</a:t>
+              <a:t>6/17/2025</a:t>
             </a:fld>
             <a:endParaRPr lang="en-US" dirty="0"/>
           </a:p>
@@ -3615,7 +3631,7 @@
           <a:p>
             <a:fld id="{2CE182A4-13DF-478D-9356-FB716B79A2E7}" type="datetime1">
               <a:rPr lang="en-US" smtClean="0"/>
-              <a:t>6/9/2025</a:t>
+              <a:t>6/17/2025</a:t>
             </a:fld>
             <a:endParaRPr lang="en-US" dirty="0"/>
           </a:p>
@@ -4383,6 +4399,901 @@
 </p:sld>
 </file>
 
+<file path=ppt/slides/slide10.xml><?xml version="1.0" encoding="utf-8"?>
+<p:sld xmlns:a="http://schemas.openxmlformats.org/drawingml/2006/main" xmlns:r="http://schemas.openxmlformats.org/officeDocument/2006/relationships" xmlns:p="http://schemas.openxmlformats.org/presentationml/2006/main">
+  <p:cSld>
+    <p:spTree>
+      <p:nvGrpSpPr>
+        <p:cNvPr id="1" name="">
+          <a:extLst>
+            <a:ext uri="{FF2B5EF4-FFF2-40B4-BE49-F238E27FC236}">
+              <a16:creationId xmlns:a16="http://schemas.microsoft.com/office/drawing/2014/main" id="{39751A8C-EC9E-FC75-6E3C-37C1E31379FE}"/>
+            </a:ext>
+          </a:extLst>
+        </p:cNvPr>
+        <p:cNvGrpSpPr/>
+        <p:nvPr/>
+      </p:nvGrpSpPr>
+      <p:grpSpPr>
+        <a:xfrm>
+          <a:off x="0" y="0"/>
+          <a:ext cx="0" cy="0"/>
+          <a:chOff x="0" y="0"/>
+          <a:chExt cx="0" cy="0"/>
+        </a:xfrm>
+      </p:grpSpPr>
+      <p:sp>
+        <p:nvSpPr>
+          <p:cNvPr id="2" name="Title 1">
+            <a:extLst>
+              <a:ext uri="{FF2B5EF4-FFF2-40B4-BE49-F238E27FC236}">
+                <a16:creationId xmlns:a16="http://schemas.microsoft.com/office/drawing/2014/main" id="{1EBB312C-26BF-320C-4362-E99C41B7D1D8}"/>
+              </a:ext>
+            </a:extLst>
+          </p:cNvPr>
+          <p:cNvSpPr>
+            <a:spLocks noGrp="1"/>
+          </p:cNvSpPr>
+          <p:nvPr>
+            <p:ph type="title"/>
+          </p:nvPr>
+        </p:nvSpPr>
+        <p:spPr>
+          <a:xfrm>
+            <a:off x="581192" y="702156"/>
+            <a:ext cx="11029616" cy="506302"/>
+          </a:xfrm>
+        </p:spPr>
+        <p:txBody>
+          <a:bodyPr>
+            <a:normAutofit fontScale="90000"/>
+          </a:bodyPr>
+          <a:lstStyle/>
+          <a:p>
+            <a:r>
+              <a:rPr lang="en-US" dirty="0"/>
+              <a:t>Moving to patterns. MVC with Routing</a:t>
+            </a:r>
+          </a:p>
+        </p:txBody>
+      </p:sp>
+      <p:sp>
+        <p:nvSpPr>
+          <p:cNvPr id="7" name="Footer Placeholder 6">
+            <a:extLst>
+              <a:ext uri="{FF2B5EF4-FFF2-40B4-BE49-F238E27FC236}">
+                <a16:creationId xmlns:a16="http://schemas.microsoft.com/office/drawing/2014/main" id="{7A406E7F-FA51-6FA7-27D3-749AEA5D7A6C}"/>
+              </a:ext>
+            </a:extLst>
+          </p:cNvPr>
+          <p:cNvSpPr>
+            <a:spLocks noGrp="1"/>
+          </p:cNvSpPr>
+          <p:nvPr>
+            <p:ph type="ftr" sz="quarter" idx="11"/>
+          </p:nvPr>
+        </p:nvSpPr>
+        <p:spPr/>
+        <p:txBody>
+          <a:bodyPr/>
+          <a:lstStyle/>
+          <a:p>
+            <a:r>
+              <a:rPr lang="en-US"/>
+              <a:t>Fedor Reznik</a:t>
+            </a:r>
+            <a:endParaRPr lang="en-US" dirty="0"/>
+          </a:p>
+        </p:txBody>
+      </p:sp>
+      <p:sp>
+        <p:nvSpPr>
+          <p:cNvPr id="8" name="Slide Number Placeholder 7">
+            <a:extLst>
+              <a:ext uri="{FF2B5EF4-FFF2-40B4-BE49-F238E27FC236}">
+                <a16:creationId xmlns:a16="http://schemas.microsoft.com/office/drawing/2014/main" id="{3D567585-BF8D-88B5-45CF-A490EADF44E4}"/>
+              </a:ext>
+            </a:extLst>
+          </p:cNvPr>
+          <p:cNvSpPr>
+            <a:spLocks noGrp="1"/>
+          </p:cNvSpPr>
+          <p:nvPr>
+            <p:ph type="sldNum" sz="quarter" idx="12"/>
+          </p:nvPr>
+        </p:nvSpPr>
+        <p:spPr/>
+        <p:txBody>
+          <a:bodyPr/>
+          <a:lstStyle/>
+          <a:p>
+            <a:fld id="{3A98EE3D-8CD1-4C3F-BD1C-C98C9596463C}" type="slidenum">
+              <a:rPr lang="en-US" smtClean="0"/>
+              <a:t>10</a:t>
+            </a:fld>
+            <a:endParaRPr lang="en-US" dirty="0"/>
+          </a:p>
+        </p:txBody>
+      </p:sp>
+      <p:sp>
+        <p:nvSpPr>
+          <p:cNvPr id="5" name="Content Placeholder 4">
+            <a:extLst>
+              <a:ext uri="{FF2B5EF4-FFF2-40B4-BE49-F238E27FC236}">
+                <a16:creationId xmlns:a16="http://schemas.microsoft.com/office/drawing/2014/main" id="{6DEF4453-841E-A560-459F-9FE7AB3DA2C2}"/>
+              </a:ext>
+            </a:extLst>
+          </p:cNvPr>
+          <p:cNvSpPr>
+            <a:spLocks noGrp="1"/>
+          </p:cNvSpPr>
+          <p:nvPr>
+            <p:ph idx="1"/>
+          </p:nvPr>
+        </p:nvSpPr>
+        <p:spPr>
+          <a:xfrm>
+            <a:off x="581192" y="1330779"/>
+            <a:ext cx="11029615" cy="4644571"/>
+          </a:xfrm>
+        </p:spPr>
+        <p:txBody>
+          <a:bodyPr/>
+          <a:lstStyle/>
+          <a:p>
+            <a:pPr marL="0" indent="0">
+              <a:buNone/>
+            </a:pPr>
+            <a:endParaRPr lang="en-US" dirty="0"/>
+          </a:p>
+        </p:txBody>
+      </p:sp>
+      <p:graphicFrame>
+        <p:nvGraphicFramePr>
+          <p:cNvPr id="12" name="Content Placeholder 5">
+            <a:extLst>
+              <a:ext uri="{FF2B5EF4-FFF2-40B4-BE49-F238E27FC236}">
+                <a16:creationId xmlns:a16="http://schemas.microsoft.com/office/drawing/2014/main" id="{D4F631DD-0E5B-5618-6F64-44027A9ED692}"/>
+              </a:ext>
+            </a:extLst>
+          </p:cNvPr>
+          <p:cNvGraphicFramePr>
+            <a:graphicFrameLocks/>
+          </p:cNvGraphicFramePr>
+          <p:nvPr>
+            <p:extLst>
+              <p:ext uri="{D42A27DB-BD31-4B8C-83A1-F6EECF244321}">
+                <p14:modId xmlns:p14="http://schemas.microsoft.com/office/powerpoint/2010/main" val="371202790"/>
+              </p:ext>
+            </p:extLst>
+          </p:nvPr>
+        </p:nvGraphicFramePr>
+        <p:xfrm>
+          <a:off x="581024" y="1467989"/>
+          <a:ext cx="11029617" cy="3012440"/>
+        </p:xfrm>
+        <a:graphic>
+          <a:graphicData uri="http://schemas.openxmlformats.org/drawingml/2006/table">
+            <a:tbl>
+              <a:tblPr firstRow="1" bandRow="1">
+                <a:tableStyleId>{5C22544A-7EE6-4342-B048-85BDC9FD1C3A}</a:tableStyleId>
+              </a:tblPr>
+              <a:tblGrid>
+                <a:gridCol w="3676539">
+                  <a:extLst>
+                    <a:ext uri="{9D8B030D-6E8A-4147-A177-3AD203B41FA5}">
+                      <a16:colId xmlns:a16="http://schemas.microsoft.com/office/drawing/2014/main" val="2195550069"/>
+                    </a:ext>
+                  </a:extLst>
+                </a:gridCol>
+                <a:gridCol w="3676539">
+                  <a:extLst>
+                    <a:ext uri="{9D8B030D-6E8A-4147-A177-3AD203B41FA5}">
+                      <a16:colId xmlns:a16="http://schemas.microsoft.com/office/drawing/2014/main" val="1697122618"/>
+                    </a:ext>
+                  </a:extLst>
+                </a:gridCol>
+                <a:gridCol w="3676539">
+                  <a:extLst>
+                    <a:ext uri="{9D8B030D-6E8A-4147-A177-3AD203B41FA5}">
+                      <a16:colId xmlns:a16="http://schemas.microsoft.com/office/drawing/2014/main" val="3656379759"/>
+                    </a:ext>
+                  </a:extLst>
+                </a:gridCol>
+              </a:tblGrid>
+              <a:tr h="370840">
+                <a:tc>
+                  <a:txBody>
+                    <a:bodyPr/>
+                    <a:lstStyle/>
+                    <a:p>
+                      <a:pPr algn="ctr"/>
+                      <a:r>
+                        <a:rPr lang="en-US" dirty="0"/>
+                        <a:t>NFR</a:t>
+                      </a:r>
+                    </a:p>
+                  </a:txBody>
+                  <a:tcPr/>
+                </a:tc>
+                <a:tc>
+                  <a:txBody>
+                    <a:bodyPr/>
+                    <a:lstStyle/>
+                    <a:p>
+                      <a:pPr algn="ctr"/>
+                      <a:r>
+                        <a:rPr lang="en-US" dirty="0"/>
+                        <a:t>CB</a:t>
+                      </a:r>
+                    </a:p>
+                  </a:txBody>
+                  <a:tcPr/>
+                </a:tc>
+                <a:tc>
+                  <a:txBody>
+                    <a:bodyPr/>
+                    <a:lstStyle/>
+                    <a:p>
+                      <a:pPr algn="ctr"/>
+                      <a:r>
+                        <a:rPr lang="en-US" dirty="0"/>
+                        <a:t>COMMENT</a:t>
+                      </a:r>
+                    </a:p>
+                  </a:txBody>
+                  <a:tcPr/>
+                </a:tc>
+                <a:extLst>
+                  <a:ext uri="{0D108BD9-81ED-4DB2-BD59-A6C34878D82A}">
+                    <a16:rowId xmlns:a16="http://schemas.microsoft.com/office/drawing/2014/main" val="928860943"/>
+                  </a:ext>
+                </a:extLst>
+              </a:tr>
+              <a:tr h="370840">
+                <a:tc>
+                  <a:txBody>
+                    <a:bodyPr/>
+                    <a:lstStyle/>
+                    <a:p>
+                      <a:r>
+                        <a:rPr lang="en-US" dirty="0"/>
+                        <a:t>Testability</a:t>
+                      </a:r>
+                    </a:p>
+                  </a:txBody>
+                  <a:tcPr/>
+                </a:tc>
+                <a:tc>
+                  <a:txBody>
+                    <a:bodyPr/>
+                    <a:lstStyle/>
+                    <a:p>
+                      <a:pPr algn="ctr"/>
+                      <a:r>
+                        <a:rPr lang="en-US" dirty="0">
+                          <a:solidFill>
+                            <a:srgbClr val="FFC000"/>
+                          </a:solidFill>
+                          <a:sym typeface="Wingdings" panose="05000000000000000000" pitchFamily="2" charset="2"/>
+                        </a:rPr>
+                        <a:t></a:t>
+                      </a:r>
+                      <a:endParaRPr lang="en-US" dirty="0"/>
+                    </a:p>
+                  </a:txBody>
+                  <a:tcPr anchor="ctr"/>
+                </a:tc>
+                <a:tc>
+                  <a:txBody>
+                    <a:bodyPr/>
+                    <a:lstStyle/>
+                    <a:p>
+                      <a:r>
+                        <a:rPr lang="en-US" sz="1600" dirty="0"/>
+                        <a:t>Heavy usage of mocks. Testing implementation.</a:t>
+                      </a:r>
+                    </a:p>
+                  </a:txBody>
+                  <a:tcPr/>
+                </a:tc>
+                <a:extLst>
+                  <a:ext uri="{0D108BD9-81ED-4DB2-BD59-A6C34878D82A}">
+                    <a16:rowId xmlns:a16="http://schemas.microsoft.com/office/drawing/2014/main" val="1010410877"/>
+                  </a:ext>
+                </a:extLst>
+              </a:tr>
+              <a:tr h="370840">
+                <a:tc>
+                  <a:txBody>
+                    <a:bodyPr/>
+                    <a:lstStyle/>
+                    <a:p>
+                      <a:r>
+                        <a:rPr lang="en-US" dirty="0"/>
+                        <a:t>Extensibility</a:t>
+                      </a:r>
+                    </a:p>
+                  </a:txBody>
+                  <a:tcPr/>
+                </a:tc>
+                <a:tc>
+                  <a:txBody>
+                    <a:bodyPr/>
+                    <a:lstStyle/>
+                    <a:p>
+                      <a:pPr algn="ctr"/>
+                      <a:r>
+                        <a:rPr lang="en-US" dirty="0">
+                          <a:solidFill>
+                            <a:srgbClr val="FFC000"/>
+                          </a:solidFill>
+                          <a:sym typeface="Wingdings" panose="05000000000000000000" pitchFamily="2" charset="2"/>
+                        </a:rPr>
+                        <a:t></a:t>
+                      </a:r>
+                      <a:endParaRPr lang="en-US" dirty="0"/>
+                    </a:p>
+                  </a:txBody>
+                  <a:tcPr anchor="ctr"/>
+                </a:tc>
+                <a:tc>
+                  <a:txBody>
+                    <a:bodyPr/>
+                    <a:lstStyle/>
+                    <a:p>
+                      <a:r>
+                        <a:rPr lang="en-US" sz="1600" dirty="0"/>
+                        <a:t>Much easier support of complex scenarios.</a:t>
+                      </a:r>
+                    </a:p>
+                  </a:txBody>
+                  <a:tcPr/>
+                </a:tc>
+                <a:extLst>
+                  <a:ext uri="{0D108BD9-81ED-4DB2-BD59-A6C34878D82A}">
+                    <a16:rowId xmlns:a16="http://schemas.microsoft.com/office/drawing/2014/main" val="1386464909"/>
+                  </a:ext>
+                </a:extLst>
+              </a:tr>
+              <a:tr h="370840">
+                <a:tc>
+                  <a:txBody>
+                    <a:bodyPr/>
+                    <a:lstStyle/>
+                    <a:p>
+                      <a:r>
+                        <a:rPr lang="en-US" dirty="0"/>
+                        <a:t>Adaptability</a:t>
+                      </a:r>
+                    </a:p>
+                  </a:txBody>
+                  <a:tcPr/>
+                </a:tc>
+                <a:tc>
+                  <a:txBody>
+                    <a:bodyPr/>
+                    <a:lstStyle/>
+                    <a:p>
+                      <a:pPr algn="ctr"/>
+                      <a:r>
+                        <a:rPr lang="en-US" dirty="0">
+                          <a:solidFill>
+                            <a:srgbClr val="FFC000"/>
+                          </a:solidFill>
+                          <a:sym typeface="Wingdings" panose="05000000000000000000" pitchFamily="2" charset="2"/>
+                        </a:rPr>
+                        <a:t></a:t>
+                      </a:r>
+                      <a:endParaRPr lang="en-US" dirty="0"/>
+                    </a:p>
+                  </a:txBody>
+                  <a:tcPr anchor="ctr"/>
+                </a:tc>
+                <a:tc>
+                  <a:txBody>
+                    <a:bodyPr/>
+                    <a:lstStyle/>
+                    <a:p>
+                      <a:r>
+                        <a:rPr lang="en-US" sz="1600" dirty="0"/>
+                        <a:t>Logic knows about UI. 2x work.</a:t>
+                      </a:r>
+                    </a:p>
+                  </a:txBody>
+                  <a:tcPr/>
+                </a:tc>
+                <a:extLst>
+                  <a:ext uri="{0D108BD9-81ED-4DB2-BD59-A6C34878D82A}">
+                    <a16:rowId xmlns:a16="http://schemas.microsoft.com/office/drawing/2014/main" val="1522253490"/>
+                  </a:ext>
+                </a:extLst>
+              </a:tr>
+              <a:tr h="370840">
+                <a:tc>
+                  <a:txBody>
+                    <a:bodyPr/>
+                    <a:lstStyle/>
+                    <a:p>
+                      <a:r>
+                        <a:rPr lang="en-US" dirty="0"/>
+                        <a:t>Effectiveness</a:t>
+                      </a:r>
+                    </a:p>
+                  </a:txBody>
+                  <a:tcPr/>
+                </a:tc>
+                <a:tc>
+                  <a:txBody>
+                    <a:bodyPr/>
+                    <a:lstStyle/>
+                    <a:p>
+                      <a:pPr algn="ctr"/>
+                      <a:r>
+                        <a:rPr lang="en-US" dirty="0">
+                          <a:solidFill>
+                            <a:srgbClr val="FFC000"/>
+                          </a:solidFill>
+                          <a:sym typeface="Wingdings" panose="05000000000000000000" pitchFamily="2" charset="2"/>
+                        </a:rPr>
+                        <a:t></a:t>
+                      </a:r>
+                      <a:endParaRPr lang="en-US" dirty="0"/>
+                    </a:p>
+                  </a:txBody>
+                  <a:tcPr anchor="ctr"/>
+                </a:tc>
+                <a:tc>
+                  <a:txBody>
+                    <a:bodyPr/>
+                    <a:lstStyle/>
+                    <a:p>
+                      <a:r>
+                        <a:rPr lang="en-US" sz="1600" dirty="0"/>
+                        <a:t>Both should agree on interfaces.</a:t>
+                      </a:r>
+                    </a:p>
+                  </a:txBody>
+                  <a:tcPr/>
+                </a:tc>
+                <a:extLst>
+                  <a:ext uri="{0D108BD9-81ED-4DB2-BD59-A6C34878D82A}">
+                    <a16:rowId xmlns:a16="http://schemas.microsoft.com/office/drawing/2014/main" val="449572642"/>
+                  </a:ext>
+                </a:extLst>
+              </a:tr>
+              <a:tr h="370840">
+                <a:tc>
+                  <a:txBody>
+                    <a:bodyPr/>
+                    <a:lstStyle/>
+                    <a:p>
+                      <a:r>
+                        <a:rPr lang="en-US" dirty="0"/>
+                        <a:t>Reusability</a:t>
+                      </a:r>
+                    </a:p>
+                  </a:txBody>
+                  <a:tcPr/>
+                </a:tc>
+                <a:tc>
+                  <a:txBody>
+                    <a:bodyPr/>
+                    <a:lstStyle/>
+                    <a:p>
+                      <a:pPr marL="0" marR="0" lvl="0" indent="0" algn="ctr" defTabSz="457200" rtl="0" eaLnBrk="1" fontAlgn="auto" latinLnBrk="0" hangingPunct="1">
+                        <a:lnSpc>
+                          <a:spcPct val="100000"/>
+                        </a:lnSpc>
+                        <a:spcBef>
+                          <a:spcPts val="0"/>
+                        </a:spcBef>
+                        <a:spcAft>
+                          <a:spcPts val="0"/>
+                        </a:spcAft>
+                        <a:buClrTx/>
+                        <a:buSzTx/>
+                        <a:buFontTx/>
+                        <a:buNone/>
+                        <a:tabLst/>
+                        <a:defRPr/>
+                      </a:pPr>
+                      <a:r>
+                        <a:rPr lang="en-US" dirty="0">
+                          <a:solidFill>
+                            <a:srgbClr val="FFC000"/>
+                          </a:solidFill>
+                          <a:sym typeface="Wingdings" panose="05000000000000000000" pitchFamily="2" charset="2"/>
+                        </a:rPr>
+                        <a:t></a:t>
+                      </a:r>
+                      <a:endParaRPr lang="en-US" dirty="0"/>
+                    </a:p>
+                  </a:txBody>
+                  <a:tcPr anchor="ctr"/>
+                </a:tc>
+                <a:tc>
+                  <a:txBody>
+                    <a:bodyPr/>
+                    <a:lstStyle/>
+                    <a:p>
+                      <a:r>
+                        <a:rPr lang="en-US" sz="1600" dirty="0"/>
+                        <a:t>Controller and View are bound.</a:t>
+                      </a:r>
+                    </a:p>
+                  </a:txBody>
+                  <a:tcPr/>
+                </a:tc>
+                <a:extLst>
+                  <a:ext uri="{0D108BD9-81ED-4DB2-BD59-A6C34878D82A}">
+                    <a16:rowId xmlns:a16="http://schemas.microsoft.com/office/drawing/2014/main" val="2812193009"/>
+                  </a:ext>
+                </a:extLst>
+              </a:tr>
+              <a:tr h="370840">
+                <a:tc>
+                  <a:txBody>
+                    <a:bodyPr/>
+                    <a:lstStyle/>
+                    <a:p>
+                      <a:r>
+                        <a:rPr lang="en-US" dirty="0"/>
+                        <a:t>Readability</a:t>
+                      </a:r>
+                    </a:p>
+                  </a:txBody>
+                  <a:tcPr/>
+                </a:tc>
+                <a:tc>
+                  <a:txBody>
+                    <a:bodyPr/>
+                    <a:lstStyle/>
+                    <a:p>
+                      <a:pPr marL="0" marR="0" lvl="0" indent="0" algn="ctr" defTabSz="457200" rtl="0" eaLnBrk="1" fontAlgn="auto" latinLnBrk="0" hangingPunct="1">
+                        <a:lnSpc>
+                          <a:spcPct val="100000"/>
+                        </a:lnSpc>
+                        <a:spcBef>
+                          <a:spcPts val="0"/>
+                        </a:spcBef>
+                        <a:spcAft>
+                          <a:spcPts val="0"/>
+                        </a:spcAft>
+                        <a:buClrTx/>
+                        <a:buSzTx/>
+                        <a:buFontTx/>
+                        <a:buNone/>
+                        <a:tabLst/>
+                        <a:defRPr/>
+                      </a:pPr>
+                      <a:r>
+                        <a:rPr lang="en-US" dirty="0">
+                          <a:solidFill>
+                            <a:srgbClr val="FF6600"/>
+                          </a:solidFill>
+                          <a:sym typeface="Wingdings" panose="05000000000000000000" pitchFamily="2" charset="2"/>
+                        </a:rPr>
+                        <a:t></a:t>
+                      </a:r>
+                      <a:endParaRPr lang="en-US" dirty="0"/>
+                    </a:p>
+                  </a:txBody>
+                  <a:tcPr anchor="ctr"/>
+                </a:tc>
+                <a:tc>
+                  <a:txBody>
+                    <a:bodyPr/>
+                    <a:lstStyle/>
+                    <a:p>
+                      <a:r>
+                        <a:rPr lang="en-US" sz="1600" dirty="0"/>
+                        <a:t>Controller/View “spaghetti” code.</a:t>
+                      </a:r>
+                    </a:p>
+                  </a:txBody>
+                  <a:tcPr/>
+                </a:tc>
+                <a:extLst>
+                  <a:ext uri="{0D108BD9-81ED-4DB2-BD59-A6C34878D82A}">
+                    <a16:rowId xmlns:a16="http://schemas.microsoft.com/office/drawing/2014/main" val="3674885099"/>
+                  </a:ext>
+                </a:extLst>
+              </a:tr>
+            </a:tbl>
+          </a:graphicData>
+        </a:graphic>
+      </p:graphicFrame>
+      <p:sp>
+        <p:nvSpPr>
+          <p:cNvPr id="13" name="TextBox 12">
+            <a:extLst>
+              <a:ext uri="{FF2B5EF4-FFF2-40B4-BE49-F238E27FC236}">
+                <a16:creationId xmlns:a16="http://schemas.microsoft.com/office/drawing/2014/main" id="{4AF6B365-C450-CEBB-8C5C-0A48C5E229E5}"/>
+              </a:ext>
+            </a:extLst>
+          </p:cNvPr>
+          <p:cNvSpPr txBox="1"/>
+          <p:nvPr/>
+        </p:nvSpPr>
+        <p:spPr>
+          <a:xfrm>
+            <a:off x="581024" y="4996632"/>
+            <a:ext cx="11029615" cy="369332"/>
+          </a:xfrm>
+          <a:prstGeom prst="rect">
+            <a:avLst/>
+          </a:prstGeom>
+          <a:noFill/>
+        </p:spPr>
+        <p:txBody>
+          <a:bodyPr wrap="square" rtlCol="0">
+            <a:spAutoFit/>
+          </a:bodyPr>
+          <a:lstStyle/>
+          <a:p>
+            <a:r>
+              <a:rPr lang="en-US" sz="1600" b="1" dirty="0"/>
+              <a:t>Legend:</a:t>
+            </a:r>
+            <a:r>
+              <a:rPr lang="en-US" dirty="0"/>
+              <a:t> </a:t>
+            </a:r>
+            <a:r>
+              <a:rPr lang="en-US" dirty="0">
+                <a:solidFill>
+                  <a:srgbClr val="FF6600"/>
+                </a:solidFill>
+                <a:sym typeface="Wingdings" panose="05000000000000000000" pitchFamily="2" charset="2"/>
+              </a:rPr>
+              <a:t> </a:t>
+            </a:r>
+            <a:r>
+              <a:rPr lang="en-US" sz="1600" dirty="0">
+                <a:sym typeface="Wingdings" panose="05000000000000000000" pitchFamily="2" charset="2"/>
+              </a:rPr>
+              <a:t>- low,</a:t>
+            </a:r>
+            <a:r>
+              <a:rPr lang="en-US" dirty="0">
+                <a:sym typeface="Wingdings" panose="05000000000000000000" pitchFamily="2" charset="2"/>
+              </a:rPr>
+              <a:t> </a:t>
+            </a:r>
+            <a:r>
+              <a:rPr lang="en-US" dirty="0">
+                <a:solidFill>
+                  <a:srgbClr val="FFC000"/>
+                </a:solidFill>
+                <a:sym typeface="Wingdings" panose="05000000000000000000" pitchFamily="2" charset="2"/>
+              </a:rPr>
+              <a:t></a:t>
+            </a:r>
+            <a:r>
+              <a:rPr lang="en-US" dirty="0">
+                <a:sym typeface="Wingdings" panose="05000000000000000000" pitchFamily="2" charset="2"/>
+              </a:rPr>
+              <a:t> - </a:t>
+            </a:r>
+            <a:r>
+              <a:rPr lang="en-US" sz="1600" dirty="0">
+                <a:sym typeface="Wingdings" panose="05000000000000000000" pitchFamily="2" charset="2"/>
+              </a:rPr>
+              <a:t>m</a:t>
+            </a:r>
+            <a:r>
+              <a:rPr lang="en-US" sz="1600" dirty="0"/>
+              <a:t>oderate, </a:t>
+            </a:r>
+            <a:r>
+              <a:rPr lang="en-US" dirty="0">
+                <a:solidFill>
+                  <a:srgbClr val="00B050"/>
+                </a:solidFill>
+                <a:sym typeface="Wingdings" panose="05000000000000000000" pitchFamily="2" charset="2"/>
+              </a:rPr>
+              <a:t></a:t>
+            </a:r>
+            <a:r>
+              <a:rPr lang="en-US" dirty="0">
+                <a:sym typeface="Wingdings" panose="05000000000000000000" pitchFamily="2" charset="2"/>
+              </a:rPr>
+              <a:t> - </a:t>
+            </a:r>
+            <a:r>
+              <a:rPr lang="en-US" sz="1600" dirty="0">
+                <a:sym typeface="Wingdings" panose="05000000000000000000" pitchFamily="2" charset="2"/>
+              </a:rPr>
+              <a:t>h</a:t>
+            </a:r>
+            <a:r>
+              <a:rPr lang="en-US" sz="1600" dirty="0"/>
+              <a:t>igh</a:t>
+            </a:r>
+          </a:p>
+        </p:txBody>
+      </p:sp>
+    </p:spTree>
+    <p:extLst>
+      <p:ext uri="{BB962C8B-B14F-4D97-AF65-F5344CB8AC3E}">
+        <p14:creationId xmlns:p14="http://schemas.microsoft.com/office/powerpoint/2010/main" val="412872736"/>
+      </p:ext>
+    </p:extLst>
+  </p:cSld>
+  <p:clrMapOvr>
+    <a:masterClrMapping/>
+  </p:clrMapOvr>
+</p:sld>
+</file>
+
+<file path=ppt/slides/slide11.xml><?xml version="1.0" encoding="utf-8"?>
+<p:sld xmlns:a="http://schemas.openxmlformats.org/drawingml/2006/main" xmlns:r="http://schemas.openxmlformats.org/officeDocument/2006/relationships" xmlns:p="http://schemas.openxmlformats.org/presentationml/2006/main">
+  <p:cSld>
+    <p:spTree>
+      <p:nvGrpSpPr>
+        <p:cNvPr id="1" name="">
+          <a:extLst>
+            <a:ext uri="{FF2B5EF4-FFF2-40B4-BE49-F238E27FC236}">
+              <a16:creationId xmlns:a16="http://schemas.microsoft.com/office/drawing/2014/main" id="{76CC14C5-1D69-5252-12DD-040E6733EAED}"/>
+            </a:ext>
+          </a:extLst>
+        </p:cNvPr>
+        <p:cNvGrpSpPr/>
+        <p:nvPr/>
+      </p:nvGrpSpPr>
+      <p:grpSpPr>
+        <a:xfrm>
+          <a:off x="0" y="0"/>
+          <a:ext cx="0" cy="0"/>
+          <a:chOff x="0" y="0"/>
+          <a:chExt cx="0" cy="0"/>
+        </a:xfrm>
+      </p:grpSpPr>
+      <p:sp>
+        <p:nvSpPr>
+          <p:cNvPr id="2" name="Title 1">
+            <a:extLst>
+              <a:ext uri="{FF2B5EF4-FFF2-40B4-BE49-F238E27FC236}">
+                <a16:creationId xmlns:a16="http://schemas.microsoft.com/office/drawing/2014/main" id="{CD1E06B8-AFD1-DA17-C10E-527299C0A5BD}"/>
+              </a:ext>
+            </a:extLst>
+          </p:cNvPr>
+          <p:cNvSpPr>
+            <a:spLocks noGrp="1"/>
+          </p:cNvSpPr>
+          <p:nvPr>
+            <p:ph type="title"/>
+          </p:nvPr>
+        </p:nvSpPr>
+        <p:spPr>
+          <a:xfrm>
+            <a:off x="581192" y="702156"/>
+            <a:ext cx="11029616" cy="506302"/>
+          </a:xfrm>
+        </p:spPr>
+        <p:txBody>
+          <a:bodyPr>
+            <a:normAutofit fontScale="90000"/>
+          </a:bodyPr>
+          <a:lstStyle/>
+          <a:p>
+            <a:r>
+              <a:rPr lang="en-US" dirty="0"/>
+              <a:t>Moving to patterns. MVC. What’s next?</a:t>
+            </a:r>
+          </a:p>
+        </p:txBody>
+      </p:sp>
+      <p:sp>
+        <p:nvSpPr>
+          <p:cNvPr id="3" name="Content Placeholder 2">
+            <a:extLst>
+              <a:ext uri="{FF2B5EF4-FFF2-40B4-BE49-F238E27FC236}">
+                <a16:creationId xmlns:a16="http://schemas.microsoft.com/office/drawing/2014/main" id="{6B51A2FE-694F-6692-B10C-6E5BF48C2817}"/>
+              </a:ext>
+            </a:extLst>
+          </p:cNvPr>
+          <p:cNvSpPr>
+            <a:spLocks noGrp="1"/>
+          </p:cNvSpPr>
+          <p:nvPr>
+            <p:ph idx="1"/>
+          </p:nvPr>
+        </p:nvSpPr>
+        <p:spPr>
+          <a:xfrm>
+            <a:off x="581192" y="1596118"/>
+            <a:ext cx="11029615" cy="4720090"/>
+          </a:xfrm>
+        </p:spPr>
+        <p:txBody>
+          <a:bodyPr anchor="ctr">
+            <a:normAutofit/>
+          </a:bodyPr>
+          <a:lstStyle/>
+          <a:p>
+            <a:pPr marL="0" indent="0" algn="ctr">
+              <a:buNone/>
+            </a:pPr>
+            <a:r>
+              <a:rPr lang="en-US" sz="2400" b="1" dirty="0"/>
+              <a:t>IF ONLY WE COULD DECOUPLE CONTROLLER FROM VIEW…</a:t>
+            </a:r>
+          </a:p>
+        </p:txBody>
+      </p:sp>
+      <p:sp>
+        <p:nvSpPr>
+          <p:cNvPr id="7" name="Footer Placeholder 6">
+            <a:extLst>
+              <a:ext uri="{FF2B5EF4-FFF2-40B4-BE49-F238E27FC236}">
+                <a16:creationId xmlns:a16="http://schemas.microsoft.com/office/drawing/2014/main" id="{0993C045-A140-0CA2-70B3-4F93138F4B17}"/>
+              </a:ext>
+            </a:extLst>
+          </p:cNvPr>
+          <p:cNvSpPr>
+            <a:spLocks noGrp="1"/>
+          </p:cNvSpPr>
+          <p:nvPr>
+            <p:ph type="ftr" sz="quarter" idx="11"/>
+          </p:nvPr>
+        </p:nvSpPr>
+        <p:spPr/>
+        <p:txBody>
+          <a:bodyPr/>
+          <a:lstStyle/>
+          <a:p>
+            <a:r>
+              <a:rPr lang="en-US"/>
+              <a:t>Fedor Reznik</a:t>
+            </a:r>
+            <a:endParaRPr lang="en-US" dirty="0"/>
+          </a:p>
+        </p:txBody>
+      </p:sp>
+      <p:sp>
+        <p:nvSpPr>
+          <p:cNvPr id="8" name="Slide Number Placeholder 7">
+            <a:extLst>
+              <a:ext uri="{FF2B5EF4-FFF2-40B4-BE49-F238E27FC236}">
+                <a16:creationId xmlns:a16="http://schemas.microsoft.com/office/drawing/2014/main" id="{1A795996-CC0C-A117-D506-9D87D895FD96}"/>
+              </a:ext>
+            </a:extLst>
+          </p:cNvPr>
+          <p:cNvSpPr>
+            <a:spLocks noGrp="1"/>
+          </p:cNvSpPr>
+          <p:nvPr>
+            <p:ph type="sldNum" sz="quarter" idx="12"/>
+          </p:nvPr>
+        </p:nvSpPr>
+        <p:spPr/>
+        <p:txBody>
+          <a:bodyPr/>
+          <a:lstStyle/>
+          <a:p>
+            <a:fld id="{3A98EE3D-8CD1-4C3F-BD1C-C98C9596463C}" type="slidenum">
+              <a:rPr lang="en-US" smtClean="0"/>
+              <a:t>11</a:t>
+            </a:fld>
+            <a:endParaRPr lang="en-US" dirty="0"/>
+          </a:p>
+        </p:txBody>
+      </p:sp>
+    </p:spTree>
+    <p:extLst>
+      <p:ext uri="{BB962C8B-B14F-4D97-AF65-F5344CB8AC3E}">
+        <p14:creationId xmlns:p14="http://schemas.microsoft.com/office/powerpoint/2010/main" val="1621591748"/>
+      </p:ext>
+    </p:extLst>
+  </p:cSld>
+  <p:clrMapOvr>
+    <a:masterClrMapping/>
+  </p:clrMapOvr>
+</p:sld>
+</file>
+
 <file path=ppt/slides/slide2.xml><?xml version="1.0" encoding="utf-8"?>
 <p:sld xmlns:a="http://schemas.openxmlformats.org/drawingml/2006/main" xmlns:r="http://schemas.openxmlformats.org/officeDocument/2006/relationships" xmlns:p="http://schemas.openxmlformats.org/presentationml/2006/main">
   <p:cSld>
@@ -4480,7 +5391,7 @@
             <a:pPr algn="just"/>
             <a:r>
               <a:rPr lang="en-US" dirty="0"/>
-              <a:t>“I want integration”. VoIP Finance story.</a:t>
+              <a:t>“I want integration”. Finance module story.</a:t>
             </a:r>
           </a:p>
           <a:p>
@@ -4597,6 +5508,186 @@
   <p:clrMapOvr>
     <a:masterClrMapping/>
   </p:clrMapOvr>
+  <p:timing>
+    <p:tnLst>
+      <p:par>
+        <p:cTn id="1" dur="indefinite" restart="never" nodeType="tmRoot">
+          <p:childTnLst>
+            <p:seq concurrent="1" nextAc="seek">
+              <p:cTn id="2" dur="indefinite" nodeType="mainSeq">
+                <p:childTnLst>
+                  <p:par>
+                    <p:cTn id="3" fill="hold">
+                      <p:stCondLst>
+                        <p:cond delay="indefinite"/>
+                      </p:stCondLst>
+                      <p:childTnLst>
+                        <p:par>
+                          <p:cTn id="4" fill="hold">
+                            <p:stCondLst>
+                              <p:cond delay="0"/>
+                            </p:stCondLst>
+                            <p:childTnLst>
+                              <p:par>
+                                <p:cTn id="5" presetID="1" presetClass="entr" presetSubtype="0" fill="hold" grpId="0" nodeType="clickEffect">
+                                  <p:stCondLst>
+                                    <p:cond delay="0"/>
+                                  </p:stCondLst>
+                                  <p:childTnLst>
+                                    <p:set>
+                                      <p:cBhvr>
+                                        <p:cTn id="6" dur="1" fill="hold">
+                                          <p:stCondLst>
+                                            <p:cond delay="0"/>
+                                          </p:stCondLst>
+                                        </p:cTn>
+                                        <p:tgtEl>
+                                          <p:spTgt spid="3">
+                                            <p:txEl>
+                                              <p:pRg st="1" end="1"/>
+                                            </p:txEl>
+                                          </p:spTgt>
+                                        </p:tgtEl>
+                                        <p:attrNameLst>
+                                          <p:attrName>style.visibility</p:attrName>
+                                        </p:attrNameLst>
+                                      </p:cBhvr>
+                                      <p:to>
+                                        <p:strVal val="visible"/>
+                                      </p:to>
+                                    </p:set>
+                                  </p:childTnLst>
+                                </p:cTn>
+                              </p:par>
+                            </p:childTnLst>
+                          </p:cTn>
+                        </p:par>
+                      </p:childTnLst>
+                    </p:cTn>
+                  </p:par>
+                  <p:par>
+                    <p:cTn id="7" fill="hold">
+                      <p:stCondLst>
+                        <p:cond delay="indefinite"/>
+                      </p:stCondLst>
+                      <p:childTnLst>
+                        <p:par>
+                          <p:cTn id="8" fill="hold">
+                            <p:stCondLst>
+                              <p:cond delay="0"/>
+                            </p:stCondLst>
+                            <p:childTnLst>
+                              <p:par>
+                                <p:cTn id="9" presetID="1" presetClass="entr" presetSubtype="0" fill="hold" grpId="0" nodeType="clickEffect">
+                                  <p:stCondLst>
+                                    <p:cond delay="0"/>
+                                  </p:stCondLst>
+                                  <p:childTnLst>
+                                    <p:set>
+                                      <p:cBhvr>
+                                        <p:cTn id="10" dur="1" fill="hold">
+                                          <p:stCondLst>
+                                            <p:cond delay="0"/>
+                                          </p:stCondLst>
+                                        </p:cTn>
+                                        <p:tgtEl>
+                                          <p:spTgt spid="3">
+                                            <p:txEl>
+                                              <p:pRg st="2" end="2"/>
+                                            </p:txEl>
+                                          </p:spTgt>
+                                        </p:tgtEl>
+                                        <p:attrNameLst>
+                                          <p:attrName>style.visibility</p:attrName>
+                                        </p:attrNameLst>
+                                      </p:cBhvr>
+                                      <p:to>
+                                        <p:strVal val="visible"/>
+                                      </p:to>
+                                    </p:set>
+                                  </p:childTnLst>
+                                </p:cTn>
+                              </p:par>
+                            </p:childTnLst>
+                          </p:cTn>
+                        </p:par>
+                      </p:childTnLst>
+                    </p:cTn>
+                  </p:par>
+                  <p:par>
+                    <p:cTn id="11" fill="hold">
+                      <p:stCondLst>
+                        <p:cond delay="indefinite"/>
+                      </p:stCondLst>
+                      <p:childTnLst>
+                        <p:par>
+                          <p:cTn id="12" fill="hold">
+                            <p:stCondLst>
+                              <p:cond delay="0"/>
+                            </p:stCondLst>
+                            <p:childTnLst>
+                              <p:par>
+                                <p:cTn id="13" presetID="1" presetClass="entr" presetSubtype="0" fill="hold" grpId="0" nodeType="clickEffect">
+                                  <p:stCondLst>
+                                    <p:cond delay="0"/>
+                                  </p:stCondLst>
+                                  <p:childTnLst>
+                                    <p:set>
+                                      <p:cBhvr>
+                                        <p:cTn id="14" dur="1" fill="hold">
+                                          <p:stCondLst>
+                                            <p:cond delay="0"/>
+                                          </p:stCondLst>
+                                        </p:cTn>
+                                        <p:tgtEl>
+                                          <p:spTgt spid="3">
+                                            <p:txEl>
+                                              <p:pRg st="3" end="3"/>
+                                            </p:txEl>
+                                          </p:spTgt>
+                                        </p:tgtEl>
+                                        <p:attrNameLst>
+                                          <p:attrName>style.visibility</p:attrName>
+                                        </p:attrNameLst>
+                                      </p:cBhvr>
+                                      <p:to>
+                                        <p:strVal val="visible"/>
+                                      </p:to>
+                                    </p:set>
+                                  </p:childTnLst>
+                                </p:cTn>
+                              </p:par>
+                            </p:childTnLst>
+                          </p:cTn>
+                        </p:par>
+                      </p:childTnLst>
+                    </p:cTn>
+                  </p:par>
+                </p:childTnLst>
+              </p:cTn>
+              <p:prevCondLst>
+                <p:cond evt="onPrev" delay="0">
+                  <p:tgtEl>
+                    <p:sldTgt/>
+                  </p:tgtEl>
+                </p:cond>
+              </p:prevCondLst>
+              <p:nextCondLst>
+                <p:cond evt="onNext" delay="0">
+                  <p:tgtEl>
+                    <p:sldTgt/>
+                  </p:tgtEl>
+                </p:cond>
+              </p:nextCondLst>
+            </p:seq>
+          </p:childTnLst>
+        </p:cTn>
+      </p:par>
+    </p:tnLst>
+    <p:bldLst>
+      <p:bldP spid="3" grpId="0" uiExpand="1" build="p"/>
+    </p:bldLst>
+  </p:timing>
 </p:sld>
 </file>
 
@@ -4718,8 +5809,13 @@
             </a:r>
             <a:r>
               <a:rPr lang="en-US" dirty="0"/>
-              <a:t> MVC sample).</a:t>
-            </a:r>
+              <a:t> </a:t>
+            </a:r>
+            <a:r>
+              <a:rPr lang="en-US"/>
+              <a:t>MVC sample).</a:t>
+            </a:r>
+            <a:endParaRPr lang="en-US" dirty="0"/>
           </a:p>
           <a:p>
             <a:pPr algn="just"/>
@@ -4796,6 +5892,1539 @@
     <p:extLst>
       <p:ext uri="{BB962C8B-B14F-4D97-AF65-F5344CB8AC3E}">
         <p14:creationId xmlns:p14="http://schemas.microsoft.com/office/powerpoint/2010/main" val="1589993249"/>
+      </p:ext>
+    </p:extLst>
+  </p:cSld>
+  <p:clrMapOvr>
+    <a:masterClrMapping/>
+  </p:clrMapOvr>
+  <p:timing>
+    <p:tnLst>
+      <p:par>
+        <p:cTn id="1" dur="indefinite" restart="never" nodeType="tmRoot">
+          <p:childTnLst>
+            <p:seq concurrent="1" nextAc="seek">
+              <p:cTn id="2" dur="indefinite" nodeType="mainSeq">
+                <p:childTnLst>
+                  <p:par>
+                    <p:cTn id="3" fill="hold">
+                      <p:stCondLst>
+                        <p:cond delay="indefinite"/>
+                      </p:stCondLst>
+                      <p:childTnLst>
+                        <p:par>
+                          <p:cTn id="4" fill="hold">
+                            <p:stCondLst>
+                              <p:cond delay="0"/>
+                            </p:stCondLst>
+                            <p:childTnLst>
+                              <p:par>
+                                <p:cTn id="5" presetID="1" presetClass="entr" presetSubtype="0" fill="hold" grpId="0" nodeType="clickEffect">
+                                  <p:stCondLst>
+                                    <p:cond delay="0"/>
+                                  </p:stCondLst>
+                                  <p:childTnLst>
+                                    <p:set>
+                                      <p:cBhvr>
+                                        <p:cTn id="6" dur="1" fill="hold">
+                                          <p:stCondLst>
+                                            <p:cond delay="0"/>
+                                          </p:stCondLst>
+                                        </p:cTn>
+                                        <p:tgtEl>
+                                          <p:spTgt spid="3">
+                                            <p:txEl>
+                                              <p:pRg st="1" end="1"/>
+                                            </p:txEl>
+                                          </p:spTgt>
+                                        </p:tgtEl>
+                                        <p:attrNameLst>
+                                          <p:attrName>style.visibility</p:attrName>
+                                        </p:attrNameLst>
+                                      </p:cBhvr>
+                                      <p:to>
+                                        <p:strVal val="visible"/>
+                                      </p:to>
+                                    </p:set>
+                                  </p:childTnLst>
+                                </p:cTn>
+                              </p:par>
+                            </p:childTnLst>
+                          </p:cTn>
+                        </p:par>
+                      </p:childTnLst>
+                    </p:cTn>
+                  </p:par>
+                  <p:par>
+                    <p:cTn id="7" fill="hold">
+                      <p:stCondLst>
+                        <p:cond delay="indefinite"/>
+                      </p:stCondLst>
+                      <p:childTnLst>
+                        <p:par>
+                          <p:cTn id="8" fill="hold">
+                            <p:stCondLst>
+                              <p:cond delay="0"/>
+                            </p:stCondLst>
+                            <p:childTnLst>
+                              <p:par>
+                                <p:cTn id="9" presetID="1" presetClass="entr" presetSubtype="0" fill="hold" grpId="0" nodeType="clickEffect">
+                                  <p:stCondLst>
+                                    <p:cond delay="0"/>
+                                  </p:stCondLst>
+                                  <p:childTnLst>
+                                    <p:set>
+                                      <p:cBhvr>
+                                        <p:cTn id="10" dur="1" fill="hold">
+                                          <p:stCondLst>
+                                            <p:cond delay="0"/>
+                                          </p:stCondLst>
+                                        </p:cTn>
+                                        <p:tgtEl>
+                                          <p:spTgt spid="3">
+                                            <p:txEl>
+                                              <p:pRg st="2" end="2"/>
+                                            </p:txEl>
+                                          </p:spTgt>
+                                        </p:tgtEl>
+                                        <p:attrNameLst>
+                                          <p:attrName>style.visibility</p:attrName>
+                                        </p:attrNameLst>
+                                      </p:cBhvr>
+                                      <p:to>
+                                        <p:strVal val="visible"/>
+                                      </p:to>
+                                    </p:set>
+                                  </p:childTnLst>
+                                </p:cTn>
+                              </p:par>
+                            </p:childTnLst>
+                          </p:cTn>
+                        </p:par>
+                      </p:childTnLst>
+                    </p:cTn>
+                  </p:par>
+                  <p:par>
+                    <p:cTn id="11" fill="hold">
+                      <p:stCondLst>
+                        <p:cond delay="indefinite"/>
+                      </p:stCondLst>
+                      <p:childTnLst>
+                        <p:par>
+                          <p:cTn id="12" fill="hold">
+                            <p:stCondLst>
+                              <p:cond delay="0"/>
+                            </p:stCondLst>
+                            <p:childTnLst>
+                              <p:par>
+                                <p:cTn id="13" presetID="1" presetClass="entr" presetSubtype="0" fill="hold" grpId="0" nodeType="clickEffect">
+                                  <p:stCondLst>
+                                    <p:cond delay="0"/>
+                                  </p:stCondLst>
+                                  <p:childTnLst>
+                                    <p:set>
+                                      <p:cBhvr>
+                                        <p:cTn id="14" dur="1" fill="hold">
+                                          <p:stCondLst>
+                                            <p:cond delay="0"/>
+                                          </p:stCondLst>
+                                        </p:cTn>
+                                        <p:tgtEl>
+                                          <p:spTgt spid="3">
+                                            <p:txEl>
+                                              <p:pRg st="3" end="3"/>
+                                            </p:txEl>
+                                          </p:spTgt>
+                                        </p:tgtEl>
+                                        <p:attrNameLst>
+                                          <p:attrName>style.visibility</p:attrName>
+                                        </p:attrNameLst>
+                                      </p:cBhvr>
+                                      <p:to>
+                                        <p:strVal val="visible"/>
+                                      </p:to>
+                                    </p:set>
+                                  </p:childTnLst>
+                                </p:cTn>
+                              </p:par>
+                            </p:childTnLst>
+                          </p:cTn>
+                        </p:par>
+                      </p:childTnLst>
+                    </p:cTn>
+                  </p:par>
+                  <p:par>
+                    <p:cTn id="15" fill="hold">
+                      <p:stCondLst>
+                        <p:cond delay="indefinite"/>
+                      </p:stCondLst>
+                      <p:childTnLst>
+                        <p:par>
+                          <p:cTn id="16" fill="hold">
+                            <p:stCondLst>
+                              <p:cond delay="0"/>
+                            </p:stCondLst>
+                            <p:childTnLst>
+                              <p:par>
+                                <p:cTn id="17" presetID="1" presetClass="entr" presetSubtype="0" fill="hold" grpId="0" nodeType="clickEffect">
+                                  <p:stCondLst>
+                                    <p:cond delay="0"/>
+                                  </p:stCondLst>
+                                  <p:childTnLst>
+                                    <p:set>
+                                      <p:cBhvr>
+                                        <p:cTn id="18" dur="1" fill="hold">
+                                          <p:stCondLst>
+                                            <p:cond delay="0"/>
+                                          </p:stCondLst>
+                                        </p:cTn>
+                                        <p:tgtEl>
+                                          <p:spTgt spid="3">
+                                            <p:txEl>
+                                              <p:pRg st="4" end="4"/>
+                                            </p:txEl>
+                                          </p:spTgt>
+                                        </p:tgtEl>
+                                        <p:attrNameLst>
+                                          <p:attrName>style.visibility</p:attrName>
+                                        </p:attrNameLst>
+                                      </p:cBhvr>
+                                      <p:to>
+                                        <p:strVal val="visible"/>
+                                      </p:to>
+                                    </p:set>
+                                  </p:childTnLst>
+                                </p:cTn>
+                              </p:par>
+                            </p:childTnLst>
+                          </p:cTn>
+                        </p:par>
+                      </p:childTnLst>
+                    </p:cTn>
+                  </p:par>
+                </p:childTnLst>
+              </p:cTn>
+              <p:prevCondLst>
+                <p:cond evt="onPrev" delay="0">
+                  <p:tgtEl>
+                    <p:sldTgt/>
+                  </p:tgtEl>
+                </p:cond>
+              </p:prevCondLst>
+              <p:nextCondLst>
+                <p:cond evt="onNext" delay="0">
+                  <p:tgtEl>
+                    <p:sldTgt/>
+                  </p:tgtEl>
+                </p:cond>
+              </p:nextCondLst>
+            </p:seq>
+          </p:childTnLst>
+        </p:cTn>
+      </p:par>
+    </p:tnLst>
+    <p:bldLst>
+      <p:bldP spid="3" grpId="0" uiExpand="1" build="p"/>
+    </p:bldLst>
+  </p:timing>
+</p:sld>
+</file>
+
+<file path=ppt/slides/slide4.xml><?xml version="1.0" encoding="utf-8"?>
+<p:sld xmlns:a="http://schemas.openxmlformats.org/drawingml/2006/main" xmlns:r="http://schemas.openxmlformats.org/officeDocument/2006/relationships" xmlns:p="http://schemas.openxmlformats.org/presentationml/2006/main">
+  <p:cSld>
+    <p:spTree>
+      <p:nvGrpSpPr>
+        <p:cNvPr id="1" name="">
+          <a:extLst>
+            <a:ext uri="{FF2B5EF4-FFF2-40B4-BE49-F238E27FC236}">
+              <a16:creationId xmlns:a16="http://schemas.microsoft.com/office/drawing/2014/main" id="{36C1E2BB-86B7-8A04-9BBF-CE872CE6EB5D}"/>
+            </a:ext>
+          </a:extLst>
+        </p:cNvPr>
+        <p:cNvGrpSpPr/>
+        <p:nvPr/>
+      </p:nvGrpSpPr>
+      <p:grpSpPr>
+        <a:xfrm>
+          <a:off x="0" y="0"/>
+          <a:ext cx="0" cy="0"/>
+          <a:chOff x="0" y="0"/>
+          <a:chExt cx="0" cy="0"/>
+        </a:xfrm>
+      </p:grpSpPr>
+      <p:sp>
+        <p:nvSpPr>
+          <p:cNvPr id="2" name="Title 1">
+            <a:extLst>
+              <a:ext uri="{FF2B5EF4-FFF2-40B4-BE49-F238E27FC236}">
+                <a16:creationId xmlns:a16="http://schemas.microsoft.com/office/drawing/2014/main" id="{58E74D6A-3247-0712-5694-3454E326F681}"/>
+              </a:ext>
+            </a:extLst>
+          </p:cNvPr>
+          <p:cNvSpPr>
+            <a:spLocks noGrp="1"/>
+          </p:cNvSpPr>
+          <p:nvPr>
+            <p:ph type="title"/>
+          </p:nvPr>
+        </p:nvSpPr>
+        <p:spPr>
+          <a:xfrm>
+            <a:off x="581192" y="702156"/>
+            <a:ext cx="11029616" cy="506302"/>
+          </a:xfrm>
+        </p:spPr>
+        <p:txBody>
+          <a:bodyPr>
+            <a:normAutofit fontScale="90000"/>
+          </a:bodyPr>
+          <a:lstStyle/>
+          <a:p>
+            <a:r>
+              <a:rPr lang="en-US" dirty="0"/>
+              <a:t>Moving to patterns. MVC</a:t>
+            </a:r>
+          </a:p>
+        </p:txBody>
+      </p:sp>
+      <p:sp>
+        <p:nvSpPr>
+          <p:cNvPr id="3" name="Content Placeholder 2">
+            <a:extLst>
+              <a:ext uri="{FF2B5EF4-FFF2-40B4-BE49-F238E27FC236}">
+                <a16:creationId xmlns:a16="http://schemas.microsoft.com/office/drawing/2014/main" id="{2A444AF7-0C81-4380-0D76-49467427A40B}"/>
+              </a:ext>
+            </a:extLst>
+          </p:cNvPr>
+          <p:cNvSpPr>
+            <a:spLocks noGrp="1"/>
+          </p:cNvSpPr>
+          <p:nvPr>
+            <p:ph idx="1"/>
+          </p:nvPr>
+        </p:nvSpPr>
+        <p:spPr>
+          <a:xfrm>
+            <a:off x="581193" y="1596118"/>
+            <a:ext cx="5350162" cy="4720090"/>
+          </a:xfrm>
+        </p:spPr>
+        <p:txBody>
+          <a:bodyPr anchor="t"/>
+          <a:lstStyle/>
+          <a:p>
+            <a:pPr marL="0" indent="0" algn="just">
+              <a:buNone/>
+            </a:pPr>
+            <a:r>
+              <a:rPr lang="en-US" b="1" dirty="0"/>
+              <a:t>Definition:</a:t>
+            </a:r>
+          </a:p>
+          <a:p>
+            <a:r>
+              <a:rPr lang="en-US" dirty="0"/>
+              <a:t>The Model represents the data in the application in a logical way; it is in charge of carrying the data and making other objects aware of data changes. May also adapt external services in more “consumable” way for View technology.</a:t>
+            </a:r>
+          </a:p>
+          <a:p>
+            <a:r>
+              <a:rPr lang="en-US" dirty="0"/>
+              <a:t>The View is the graphical representation of the Model; it is responsible for displaying the Model data in suitable form.</a:t>
+            </a:r>
+          </a:p>
+          <a:p>
+            <a:r>
+              <a:rPr lang="en-US" dirty="0"/>
+              <a:t>The Controller is the orchestrator of this pattern; it is in charge of intercepting user input (mouse and keyboard) and interacting with the Model and/or the View.</a:t>
+            </a:r>
+          </a:p>
+        </p:txBody>
+      </p:sp>
+      <p:sp>
+        <p:nvSpPr>
+          <p:cNvPr id="7" name="Footer Placeholder 6">
+            <a:extLst>
+              <a:ext uri="{FF2B5EF4-FFF2-40B4-BE49-F238E27FC236}">
+                <a16:creationId xmlns:a16="http://schemas.microsoft.com/office/drawing/2014/main" id="{DD1D871D-9B06-E783-0CE3-9FA59DF69BD8}"/>
+              </a:ext>
+            </a:extLst>
+          </p:cNvPr>
+          <p:cNvSpPr>
+            <a:spLocks noGrp="1"/>
+          </p:cNvSpPr>
+          <p:nvPr>
+            <p:ph type="ftr" sz="quarter" idx="11"/>
+          </p:nvPr>
+        </p:nvSpPr>
+        <p:spPr/>
+        <p:txBody>
+          <a:bodyPr/>
+          <a:lstStyle/>
+          <a:p>
+            <a:r>
+              <a:rPr lang="en-US"/>
+              <a:t>Fedor Reznik</a:t>
+            </a:r>
+            <a:endParaRPr lang="en-US" dirty="0"/>
+          </a:p>
+        </p:txBody>
+      </p:sp>
+      <p:sp>
+        <p:nvSpPr>
+          <p:cNvPr id="8" name="Slide Number Placeholder 7">
+            <a:extLst>
+              <a:ext uri="{FF2B5EF4-FFF2-40B4-BE49-F238E27FC236}">
+                <a16:creationId xmlns:a16="http://schemas.microsoft.com/office/drawing/2014/main" id="{9654969C-B67A-592D-9D29-0C95391D4C1F}"/>
+              </a:ext>
+            </a:extLst>
+          </p:cNvPr>
+          <p:cNvSpPr>
+            <a:spLocks noGrp="1"/>
+          </p:cNvSpPr>
+          <p:nvPr>
+            <p:ph type="sldNum" sz="quarter" idx="12"/>
+          </p:nvPr>
+        </p:nvSpPr>
+        <p:spPr/>
+        <p:txBody>
+          <a:bodyPr/>
+          <a:lstStyle/>
+          <a:p>
+            <a:fld id="{3A98EE3D-8CD1-4C3F-BD1C-C98C9596463C}" type="slidenum">
+              <a:rPr lang="en-US" smtClean="0"/>
+              <a:t>4</a:t>
+            </a:fld>
+            <a:endParaRPr lang="en-US" dirty="0"/>
+          </a:p>
+        </p:txBody>
+      </p:sp>
+      <p:pic>
+        <p:nvPicPr>
+          <p:cNvPr id="5" name="Picture 4">
+            <a:extLst>
+              <a:ext uri="{FF2B5EF4-FFF2-40B4-BE49-F238E27FC236}">
+                <a16:creationId xmlns:a16="http://schemas.microsoft.com/office/drawing/2014/main" id="{2ABB871D-C677-0C72-5AE8-483164E27806}"/>
+              </a:ext>
+            </a:extLst>
+          </p:cNvPr>
+          <p:cNvPicPr>
+            <a:picLocks noChangeAspect="1"/>
+          </p:cNvPicPr>
+          <p:nvPr/>
+        </p:nvPicPr>
+        <p:blipFill>
+          <a:blip r:embed="rId2"/>
+          <a:stretch>
+            <a:fillRect/>
+          </a:stretch>
+        </p:blipFill>
+        <p:spPr>
+          <a:xfrm>
+            <a:off x="7025024" y="1596118"/>
+            <a:ext cx="3922338" cy="4355646"/>
+          </a:xfrm>
+          <a:prstGeom prst="rect">
+            <a:avLst/>
+          </a:prstGeom>
+        </p:spPr>
+      </p:pic>
+    </p:spTree>
+    <p:extLst>
+      <p:ext uri="{BB962C8B-B14F-4D97-AF65-F5344CB8AC3E}">
+        <p14:creationId xmlns:p14="http://schemas.microsoft.com/office/powerpoint/2010/main" val="2204478036"/>
+      </p:ext>
+    </p:extLst>
+  </p:cSld>
+  <p:clrMapOvr>
+    <a:masterClrMapping/>
+  </p:clrMapOvr>
+</p:sld>
+</file>
+
+<file path=ppt/slides/slide5.xml><?xml version="1.0" encoding="utf-8"?>
+<p:sld xmlns:a="http://schemas.openxmlformats.org/drawingml/2006/main" xmlns:r="http://schemas.openxmlformats.org/officeDocument/2006/relationships" xmlns:p="http://schemas.openxmlformats.org/presentationml/2006/main">
+  <p:cSld>
+    <p:spTree>
+      <p:nvGrpSpPr>
+        <p:cNvPr id="1" name="">
+          <a:extLst>
+            <a:ext uri="{FF2B5EF4-FFF2-40B4-BE49-F238E27FC236}">
+              <a16:creationId xmlns:a16="http://schemas.microsoft.com/office/drawing/2014/main" id="{C3AAA2BA-C572-3F8B-36D0-1188EB1C97B7}"/>
+            </a:ext>
+          </a:extLst>
+        </p:cNvPr>
+        <p:cNvGrpSpPr/>
+        <p:nvPr/>
+      </p:nvGrpSpPr>
+      <p:grpSpPr>
+        <a:xfrm>
+          <a:off x="0" y="0"/>
+          <a:ext cx="0" cy="0"/>
+          <a:chOff x="0" y="0"/>
+          <a:chExt cx="0" cy="0"/>
+        </a:xfrm>
+      </p:grpSpPr>
+      <p:sp>
+        <p:nvSpPr>
+          <p:cNvPr id="2" name="Title 1">
+            <a:extLst>
+              <a:ext uri="{FF2B5EF4-FFF2-40B4-BE49-F238E27FC236}">
+                <a16:creationId xmlns:a16="http://schemas.microsoft.com/office/drawing/2014/main" id="{2B4B3D30-F668-5DAF-F183-1D31529D3787}"/>
+              </a:ext>
+            </a:extLst>
+          </p:cNvPr>
+          <p:cNvSpPr>
+            <a:spLocks noGrp="1"/>
+          </p:cNvSpPr>
+          <p:nvPr>
+            <p:ph type="title"/>
+          </p:nvPr>
+        </p:nvSpPr>
+        <p:spPr>
+          <a:xfrm>
+            <a:off x="581192" y="702156"/>
+            <a:ext cx="11029616" cy="506302"/>
+          </a:xfrm>
+        </p:spPr>
+        <p:txBody>
+          <a:bodyPr>
+            <a:normAutofit fontScale="90000"/>
+          </a:bodyPr>
+          <a:lstStyle/>
+          <a:p>
+            <a:r>
+              <a:rPr lang="en-US" dirty="0"/>
+              <a:t>Moving to patterns. MVC</a:t>
+            </a:r>
+          </a:p>
+        </p:txBody>
+      </p:sp>
+      <p:sp>
+        <p:nvSpPr>
+          <p:cNvPr id="3" name="Content Placeholder 2">
+            <a:extLst>
+              <a:ext uri="{FF2B5EF4-FFF2-40B4-BE49-F238E27FC236}">
+                <a16:creationId xmlns:a16="http://schemas.microsoft.com/office/drawing/2014/main" id="{27231D95-305E-46E5-6167-2E43F9178875}"/>
+              </a:ext>
+            </a:extLst>
+          </p:cNvPr>
+          <p:cNvSpPr>
+            <a:spLocks noGrp="1"/>
+          </p:cNvSpPr>
+          <p:nvPr>
+            <p:ph idx="1"/>
+          </p:nvPr>
+        </p:nvSpPr>
+        <p:spPr>
+          <a:xfrm>
+            <a:off x="581192" y="1596118"/>
+            <a:ext cx="11029615" cy="4720090"/>
+          </a:xfrm>
+        </p:spPr>
+        <p:txBody>
+          <a:bodyPr anchor="t"/>
+          <a:lstStyle/>
+          <a:p>
+            <a:pPr marL="0" indent="0" algn="just">
+              <a:buNone/>
+            </a:pPr>
+            <a:r>
+              <a:rPr lang="en-US" b="1" dirty="0"/>
+              <a:t>Variation:</a:t>
+            </a:r>
+          </a:p>
+          <a:p>
+            <a:pPr algn="just"/>
+            <a:r>
+              <a:rPr lang="en-US" dirty="0"/>
+              <a:t>How user should actually interact with Controller? View knows about Controller</a:t>
+            </a:r>
+          </a:p>
+          <a:p>
+            <a:pPr algn="just"/>
+            <a:r>
+              <a:rPr lang="en-US" dirty="0"/>
+              <a:t>Should we de-couple Model from the View? Controller knows about View; View uses Model as state.</a:t>
+            </a:r>
+          </a:p>
+          <a:p>
+            <a:pPr algn="just"/>
+            <a:endParaRPr lang="en-US" dirty="0"/>
+          </a:p>
+          <a:p>
+            <a:pPr algn="just"/>
+            <a:endParaRPr lang="en-US" dirty="0"/>
+          </a:p>
+          <a:p>
+            <a:pPr marL="0" lvl="0" indent="0" algn="ctr">
+              <a:buClr>
+                <a:srgbClr val="1CADE4"/>
+              </a:buClr>
+              <a:buNone/>
+            </a:pPr>
+            <a:r>
+              <a:rPr lang="en-US" sz="3200" b="1" dirty="0">
+                <a:solidFill>
+                  <a:prstClr val="black">
+                    <a:lumMod val="75000"/>
+                    <a:lumOff val="25000"/>
+                  </a:prstClr>
+                </a:solidFill>
+              </a:rPr>
+              <a:t>LET’S CODE!</a:t>
+            </a:r>
+          </a:p>
+          <a:p>
+            <a:pPr marL="0" indent="0" algn="just">
+              <a:buNone/>
+            </a:pPr>
+            <a:endParaRPr lang="en-US" dirty="0"/>
+          </a:p>
+        </p:txBody>
+      </p:sp>
+      <p:sp>
+        <p:nvSpPr>
+          <p:cNvPr id="7" name="Footer Placeholder 6">
+            <a:extLst>
+              <a:ext uri="{FF2B5EF4-FFF2-40B4-BE49-F238E27FC236}">
+                <a16:creationId xmlns:a16="http://schemas.microsoft.com/office/drawing/2014/main" id="{CC6FBD9D-9BB7-1F4B-A962-5A9D5C044999}"/>
+              </a:ext>
+            </a:extLst>
+          </p:cNvPr>
+          <p:cNvSpPr>
+            <a:spLocks noGrp="1"/>
+          </p:cNvSpPr>
+          <p:nvPr>
+            <p:ph type="ftr" sz="quarter" idx="11"/>
+          </p:nvPr>
+        </p:nvSpPr>
+        <p:spPr/>
+        <p:txBody>
+          <a:bodyPr/>
+          <a:lstStyle/>
+          <a:p>
+            <a:r>
+              <a:rPr lang="en-US"/>
+              <a:t>Fedor Reznik</a:t>
+            </a:r>
+            <a:endParaRPr lang="en-US" dirty="0"/>
+          </a:p>
+        </p:txBody>
+      </p:sp>
+      <p:sp>
+        <p:nvSpPr>
+          <p:cNvPr id="8" name="Slide Number Placeholder 7">
+            <a:extLst>
+              <a:ext uri="{FF2B5EF4-FFF2-40B4-BE49-F238E27FC236}">
+                <a16:creationId xmlns:a16="http://schemas.microsoft.com/office/drawing/2014/main" id="{23C3ABCC-F05C-CCAF-78E0-6848BE6AAAC6}"/>
+              </a:ext>
+            </a:extLst>
+          </p:cNvPr>
+          <p:cNvSpPr>
+            <a:spLocks noGrp="1"/>
+          </p:cNvSpPr>
+          <p:nvPr>
+            <p:ph type="sldNum" sz="quarter" idx="12"/>
+          </p:nvPr>
+        </p:nvSpPr>
+        <p:spPr/>
+        <p:txBody>
+          <a:bodyPr/>
+          <a:lstStyle/>
+          <a:p>
+            <a:fld id="{3A98EE3D-8CD1-4C3F-BD1C-C98C9596463C}" type="slidenum">
+              <a:rPr lang="en-US" smtClean="0"/>
+              <a:t>5</a:t>
+            </a:fld>
+            <a:endParaRPr lang="en-US" dirty="0"/>
+          </a:p>
+        </p:txBody>
+      </p:sp>
+    </p:spTree>
+    <p:extLst>
+      <p:ext uri="{BB962C8B-B14F-4D97-AF65-F5344CB8AC3E}">
+        <p14:creationId xmlns:p14="http://schemas.microsoft.com/office/powerpoint/2010/main" val="1083187789"/>
+      </p:ext>
+    </p:extLst>
+  </p:cSld>
+  <p:clrMapOvr>
+    <a:masterClrMapping/>
+  </p:clrMapOvr>
+</p:sld>
+</file>
+
+<file path=ppt/slides/slide6.xml><?xml version="1.0" encoding="utf-8"?>
+<p:sld xmlns:a="http://schemas.openxmlformats.org/drawingml/2006/main" xmlns:r="http://schemas.openxmlformats.org/officeDocument/2006/relationships" xmlns:p="http://schemas.openxmlformats.org/presentationml/2006/main">
+  <p:cSld>
+    <p:spTree>
+      <p:nvGrpSpPr>
+        <p:cNvPr id="1" name="">
+          <a:extLst>
+            <a:ext uri="{FF2B5EF4-FFF2-40B4-BE49-F238E27FC236}">
+              <a16:creationId xmlns:a16="http://schemas.microsoft.com/office/drawing/2014/main" id="{74963C40-864D-7FB7-2C7C-EC361B27B5C1}"/>
+            </a:ext>
+          </a:extLst>
+        </p:cNvPr>
+        <p:cNvGrpSpPr/>
+        <p:nvPr/>
+      </p:nvGrpSpPr>
+      <p:grpSpPr>
+        <a:xfrm>
+          <a:off x="0" y="0"/>
+          <a:ext cx="0" cy="0"/>
+          <a:chOff x="0" y="0"/>
+          <a:chExt cx="0" cy="0"/>
+        </a:xfrm>
+      </p:grpSpPr>
+      <p:sp>
+        <p:nvSpPr>
+          <p:cNvPr id="2" name="Title 1">
+            <a:extLst>
+              <a:ext uri="{FF2B5EF4-FFF2-40B4-BE49-F238E27FC236}">
+                <a16:creationId xmlns:a16="http://schemas.microsoft.com/office/drawing/2014/main" id="{2E06FC34-F4B2-0434-3038-3E06B9A186DE}"/>
+              </a:ext>
+            </a:extLst>
+          </p:cNvPr>
+          <p:cNvSpPr>
+            <a:spLocks noGrp="1"/>
+          </p:cNvSpPr>
+          <p:nvPr>
+            <p:ph type="title"/>
+          </p:nvPr>
+        </p:nvSpPr>
+        <p:spPr>
+          <a:xfrm>
+            <a:off x="581192" y="702156"/>
+            <a:ext cx="11029616" cy="506302"/>
+          </a:xfrm>
+        </p:spPr>
+        <p:txBody>
+          <a:bodyPr>
+            <a:normAutofit fontScale="90000"/>
+          </a:bodyPr>
+          <a:lstStyle/>
+          <a:p>
+            <a:r>
+              <a:rPr lang="en-US" dirty="0"/>
+              <a:t>Moving to patterns. MVC</a:t>
+            </a:r>
+          </a:p>
+        </p:txBody>
+      </p:sp>
+      <p:sp>
+        <p:nvSpPr>
+          <p:cNvPr id="3" name="Content Placeholder 2">
+            <a:extLst>
+              <a:ext uri="{FF2B5EF4-FFF2-40B4-BE49-F238E27FC236}">
+                <a16:creationId xmlns:a16="http://schemas.microsoft.com/office/drawing/2014/main" id="{2E374F09-C5C2-3E58-B4CF-C5DA64E64C81}"/>
+              </a:ext>
+            </a:extLst>
+          </p:cNvPr>
+          <p:cNvSpPr>
+            <a:spLocks noGrp="1"/>
+          </p:cNvSpPr>
+          <p:nvPr>
+            <p:ph idx="1"/>
+          </p:nvPr>
+        </p:nvSpPr>
+        <p:spPr>
+          <a:xfrm>
+            <a:off x="581192" y="1596118"/>
+            <a:ext cx="11029615" cy="4720090"/>
+          </a:xfrm>
+        </p:spPr>
+        <p:txBody>
+          <a:bodyPr anchor="t"/>
+          <a:lstStyle/>
+          <a:p>
+            <a:pPr marL="0" indent="0" algn="just">
+              <a:buNone/>
+            </a:pPr>
+            <a:r>
+              <a:rPr lang="en-US" b="1" dirty="0"/>
+              <a:t>Simple implementation:</a:t>
+            </a:r>
+          </a:p>
+          <a:p>
+            <a:pPr algn="just"/>
+            <a:r>
+              <a:rPr lang="en-US" dirty="0"/>
+              <a:t>A word on DI.</a:t>
+            </a:r>
+          </a:p>
+          <a:p>
+            <a:pPr algn="just"/>
+            <a:r>
+              <a:rPr lang="en-US" dirty="0"/>
+              <a:t>A word on folder structure.</a:t>
+            </a:r>
+          </a:p>
+          <a:p>
+            <a:pPr algn="just"/>
+            <a:r>
+              <a:rPr lang="en-US" dirty="0"/>
+              <a:t>Simple engine overview.</a:t>
+            </a:r>
+          </a:p>
+          <a:p>
+            <a:pPr algn="just"/>
+            <a:r>
+              <a:rPr lang="en-US" dirty="0"/>
+              <a:t>Model adapts driver – no more exception handling for consumer. </a:t>
+            </a:r>
+            <a:r>
+              <a:rPr lang="en-US" dirty="0" err="1"/>
+              <a:t>IDisposable</a:t>
+            </a:r>
+            <a:r>
+              <a:rPr lang="en-US" dirty="0"/>
+              <a:t>.</a:t>
+            </a:r>
+          </a:p>
+          <a:p>
+            <a:pPr algn="just"/>
+            <a:r>
+              <a:rPr lang="en-US" dirty="0"/>
+              <a:t>Controller adapts concurrency and manages lifetime.</a:t>
+            </a:r>
+          </a:p>
+          <a:p>
+            <a:pPr algn="just"/>
+            <a:r>
+              <a:rPr lang="en-US" dirty="0"/>
+              <a:t>View states it’s possibilities and uses controller to process user input. View also guards the MT, not bother consumers.</a:t>
+            </a:r>
+          </a:p>
+          <a:p>
+            <a:pPr marL="0" indent="0" algn="just">
+              <a:buNone/>
+            </a:pPr>
+            <a:endParaRPr lang="en-US" dirty="0"/>
+          </a:p>
+        </p:txBody>
+      </p:sp>
+      <p:sp>
+        <p:nvSpPr>
+          <p:cNvPr id="7" name="Footer Placeholder 6">
+            <a:extLst>
+              <a:ext uri="{FF2B5EF4-FFF2-40B4-BE49-F238E27FC236}">
+                <a16:creationId xmlns:a16="http://schemas.microsoft.com/office/drawing/2014/main" id="{DA877141-AFFA-C011-F52F-CDBEADAF092E}"/>
+              </a:ext>
+            </a:extLst>
+          </p:cNvPr>
+          <p:cNvSpPr>
+            <a:spLocks noGrp="1"/>
+          </p:cNvSpPr>
+          <p:nvPr>
+            <p:ph type="ftr" sz="quarter" idx="11"/>
+          </p:nvPr>
+        </p:nvSpPr>
+        <p:spPr/>
+        <p:txBody>
+          <a:bodyPr/>
+          <a:lstStyle/>
+          <a:p>
+            <a:r>
+              <a:rPr lang="en-US"/>
+              <a:t>Fedor Reznik</a:t>
+            </a:r>
+            <a:endParaRPr lang="en-US" dirty="0"/>
+          </a:p>
+        </p:txBody>
+      </p:sp>
+      <p:sp>
+        <p:nvSpPr>
+          <p:cNvPr id="8" name="Slide Number Placeholder 7">
+            <a:extLst>
+              <a:ext uri="{FF2B5EF4-FFF2-40B4-BE49-F238E27FC236}">
+                <a16:creationId xmlns:a16="http://schemas.microsoft.com/office/drawing/2014/main" id="{C7F021AB-6735-D3AC-5ADA-F7416C51E4F1}"/>
+              </a:ext>
+            </a:extLst>
+          </p:cNvPr>
+          <p:cNvSpPr>
+            <a:spLocks noGrp="1"/>
+          </p:cNvSpPr>
+          <p:nvPr>
+            <p:ph type="sldNum" sz="quarter" idx="12"/>
+          </p:nvPr>
+        </p:nvSpPr>
+        <p:spPr/>
+        <p:txBody>
+          <a:bodyPr/>
+          <a:lstStyle/>
+          <a:p>
+            <a:fld id="{3A98EE3D-8CD1-4C3F-BD1C-C98C9596463C}" type="slidenum">
+              <a:rPr lang="en-US" smtClean="0"/>
+              <a:t>6</a:t>
+            </a:fld>
+            <a:endParaRPr lang="en-US" dirty="0"/>
+          </a:p>
+        </p:txBody>
+      </p:sp>
+    </p:spTree>
+    <p:extLst>
+      <p:ext uri="{BB962C8B-B14F-4D97-AF65-F5344CB8AC3E}">
+        <p14:creationId xmlns:p14="http://schemas.microsoft.com/office/powerpoint/2010/main" val="2118009276"/>
+      </p:ext>
+    </p:extLst>
+  </p:cSld>
+  <p:clrMapOvr>
+    <a:masterClrMapping/>
+  </p:clrMapOvr>
+</p:sld>
+</file>
+
+<file path=ppt/slides/slide7.xml><?xml version="1.0" encoding="utf-8"?>
+<p:sld xmlns:a="http://schemas.openxmlformats.org/drawingml/2006/main" xmlns:r="http://schemas.openxmlformats.org/officeDocument/2006/relationships" xmlns:p="http://schemas.openxmlformats.org/presentationml/2006/main">
+  <p:cSld>
+    <p:spTree>
+      <p:nvGrpSpPr>
+        <p:cNvPr id="1" name="">
+          <a:extLst>
+            <a:ext uri="{FF2B5EF4-FFF2-40B4-BE49-F238E27FC236}">
+              <a16:creationId xmlns:a16="http://schemas.microsoft.com/office/drawing/2014/main" id="{B9984942-0E88-C58E-AAB9-1E012A8968BF}"/>
+            </a:ext>
+          </a:extLst>
+        </p:cNvPr>
+        <p:cNvGrpSpPr/>
+        <p:nvPr/>
+      </p:nvGrpSpPr>
+      <p:grpSpPr>
+        <a:xfrm>
+          <a:off x="0" y="0"/>
+          <a:ext cx="0" cy="0"/>
+          <a:chOff x="0" y="0"/>
+          <a:chExt cx="0" cy="0"/>
+        </a:xfrm>
+      </p:grpSpPr>
+      <p:sp>
+        <p:nvSpPr>
+          <p:cNvPr id="2" name="Title 1">
+            <a:extLst>
+              <a:ext uri="{FF2B5EF4-FFF2-40B4-BE49-F238E27FC236}">
+                <a16:creationId xmlns:a16="http://schemas.microsoft.com/office/drawing/2014/main" id="{B45EFCD7-8650-6DEA-7AA0-1F93C0131681}"/>
+              </a:ext>
+            </a:extLst>
+          </p:cNvPr>
+          <p:cNvSpPr>
+            <a:spLocks noGrp="1"/>
+          </p:cNvSpPr>
+          <p:nvPr>
+            <p:ph type="title"/>
+          </p:nvPr>
+        </p:nvSpPr>
+        <p:spPr>
+          <a:xfrm>
+            <a:off x="581192" y="702156"/>
+            <a:ext cx="11029616" cy="506302"/>
+          </a:xfrm>
+        </p:spPr>
+        <p:txBody>
+          <a:bodyPr>
+            <a:normAutofit fontScale="90000"/>
+          </a:bodyPr>
+          <a:lstStyle/>
+          <a:p>
+            <a:r>
+              <a:rPr lang="en-US" dirty="0"/>
+              <a:t>Moving to patterns. MVC</a:t>
+            </a:r>
+          </a:p>
+        </p:txBody>
+      </p:sp>
+      <p:sp>
+        <p:nvSpPr>
+          <p:cNvPr id="3" name="Content Placeholder 2">
+            <a:extLst>
+              <a:ext uri="{FF2B5EF4-FFF2-40B4-BE49-F238E27FC236}">
+                <a16:creationId xmlns:a16="http://schemas.microsoft.com/office/drawing/2014/main" id="{E57E94F5-2DEB-45E3-F652-BA24D0F5D74F}"/>
+              </a:ext>
+            </a:extLst>
+          </p:cNvPr>
+          <p:cNvSpPr>
+            <a:spLocks noGrp="1"/>
+          </p:cNvSpPr>
+          <p:nvPr>
+            <p:ph idx="1"/>
+          </p:nvPr>
+        </p:nvSpPr>
+        <p:spPr>
+          <a:xfrm>
+            <a:off x="581192" y="1596118"/>
+            <a:ext cx="11029615" cy="4720090"/>
+          </a:xfrm>
+        </p:spPr>
+        <p:txBody>
+          <a:bodyPr anchor="t"/>
+          <a:lstStyle/>
+          <a:p>
+            <a:pPr marL="0" indent="0" algn="just">
+              <a:buNone/>
+            </a:pPr>
+            <a:r>
+              <a:rPr lang="en-US" b="1" dirty="0"/>
+              <a:t>SECOND USER STORY:</a:t>
+            </a:r>
+          </a:p>
+          <a:p>
+            <a:pPr algn="just"/>
+            <a:r>
+              <a:rPr lang="en-US" dirty="0"/>
+              <a:t>We want to get rid of modals and have the embedded screens.</a:t>
+            </a:r>
+          </a:p>
+          <a:p>
+            <a:pPr marL="306000" marR="0" lvl="0" indent="-306000" algn="just" defTabSz="457200" rtl="0" eaLnBrk="1" fontAlgn="auto" latinLnBrk="0" hangingPunct="1">
+              <a:lnSpc>
+                <a:spcPct val="110000"/>
+              </a:lnSpc>
+              <a:spcBef>
+                <a:spcPct val="20000"/>
+              </a:spcBef>
+              <a:spcAft>
+                <a:spcPts val="600"/>
+              </a:spcAft>
+              <a:buClr>
+                <a:srgbClr val="1CADE4"/>
+              </a:buClr>
+              <a:buSzPct val="92000"/>
+              <a:buFont typeface="Wingdings 2" panose="05020102010507070707" pitchFamily="18" charset="2"/>
+              <a:buChar char=""/>
+              <a:tabLst/>
+              <a:defRPr/>
+            </a:pPr>
+            <a:endParaRPr kumimoji="0" lang="en-US" sz="1700" b="0" i="0" u="none" strike="noStrike" kern="1200" cap="none" spc="0" normalizeH="0" baseline="0" noProof="0" dirty="0">
+              <a:ln>
+                <a:noFill/>
+              </a:ln>
+              <a:solidFill>
+                <a:prstClr val="black">
+                  <a:lumMod val="75000"/>
+                  <a:lumOff val="25000"/>
+                </a:prstClr>
+              </a:solidFill>
+              <a:effectLst/>
+              <a:uLnTx/>
+              <a:uFillTx/>
+              <a:latin typeface="Franklin Gothic Book" panose="020B0502020104020203"/>
+              <a:ea typeface="+mn-ea"/>
+              <a:cs typeface="+mn-cs"/>
+            </a:endParaRPr>
+          </a:p>
+          <a:p>
+            <a:pPr marL="306000" marR="0" lvl="0" indent="-306000" algn="just" defTabSz="457200" rtl="0" eaLnBrk="1" fontAlgn="auto" latinLnBrk="0" hangingPunct="1">
+              <a:lnSpc>
+                <a:spcPct val="110000"/>
+              </a:lnSpc>
+              <a:spcBef>
+                <a:spcPct val="20000"/>
+              </a:spcBef>
+              <a:spcAft>
+                <a:spcPts val="600"/>
+              </a:spcAft>
+              <a:buClr>
+                <a:srgbClr val="1CADE4"/>
+              </a:buClr>
+              <a:buSzPct val="92000"/>
+              <a:buFont typeface="Wingdings 2" panose="05020102010507070707" pitchFamily="18" charset="2"/>
+              <a:buChar char=""/>
+              <a:tabLst/>
+              <a:defRPr/>
+            </a:pPr>
+            <a:endParaRPr kumimoji="0" lang="en-US" sz="1700" b="0" i="0" u="none" strike="noStrike" kern="1200" cap="none" spc="0" normalizeH="0" baseline="0" noProof="0" dirty="0">
+              <a:ln>
+                <a:noFill/>
+              </a:ln>
+              <a:solidFill>
+                <a:prstClr val="black">
+                  <a:lumMod val="75000"/>
+                  <a:lumOff val="25000"/>
+                </a:prstClr>
+              </a:solidFill>
+              <a:effectLst/>
+              <a:uLnTx/>
+              <a:uFillTx/>
+              <a:latin typeface="Franklin Gothic Book" panose="020B0502020104020203"/>
+              <a:ea typeface="+mn-ea"/>
+              <a:cs typeface="+mn-cs"/>
+            </a:endParaRPr>
+          </a:p>
+          <a:p>
+            <a:pPr marL="0" marR="0" lvl="0" indent="0" algn="ctr" defTabSz="457200" rtl="0" eaLnBrk="1" fontAlgn="auto" latinLnBrk="0" hangingPunct="1">
+              <a:lnSpc>
+                <a:spcPct val="110000"/>
+              </a:lnSpc>
+              <a:spcBef>
+                <a:spcPct val="20000"/>
+              </a:spcBef>
+              <a:spcAft>
+                <a:spcPts val="600"/>
+              </a:spcAft>
+              <a:buClr>
+                <a:srgbClr val="1CADE4"/>
+              </a:buClr>
+              <a:buSzPct val="92000"/>
+              <a:buFont typeface="Wingdings 2" panose="05020102010507070707" pitchFamily="18" charset="2"/>
+              <a:buNone/>
+              <a:tabLst/>
+              <a:defRPr/>
+            </a:pPr>
+            <a:r>
+              <a:rPr kumimoji="0" lang="en-US" sz="3200" b="1" i="0" u="none" strike="noStrike" kern="1200" cap="none" spc="0" normalizeH="0" baseline="0" noProof="0" dirty="0">
+                <a:ln>
+                  <a:noFill/>
+                </a:ln>
+                <a:solidFill>
+                  <a:prstClr val="black">
+                    <a:lumMod val="75000"/>
+                    <a:lumOff val="25000"/>
+                  </a:prstClr>
+                </a:solidFill>
+                <a:effectLst/>
+                <a:uLnTx/>
+                <a:uFillTx/>
+                <a:latin typeface="Franklin Gothic Book" panose="020B0502020104020203"/>
+                <a:ea typeface="+mn-ea"/>
+                <a:cs typeface="+mn-cs"/>
+              </a:rPr>
+              <a:t>LET’S CODE!</a:t>
+            </a:r>
+          </a:p>
+          <a:p>
+            <a:pPr algn="just"/>
+            <a:endParaRPr lang="en-US" dirty="0"/>
+          </a:p>
+        </p:txBody>
+      </p:sp>
+      <p:sp>
+        <p:nvSpPr>
+          <p:cNvPr id="7" name="Footer Placeholder 6">
+            <a:extLst>
+              <a:ext uri="{FF2B5EF4-FFF2-40B4-BE49-F238E27FC236}">
+                <a16:creationId xmlns:a16="http://schemas.microsoft.com/office/drawing/2014/main" id="{81C22CE7-9801-2221-CF97-DCACBEAE15CE}"/>
+              </a:ext>
+            </a:extLst>
+          </p:cNvPr>
+          <p:cNvSpPr>
+            <a:spLocks noGrp="1"/>
+          </p:cNvSpPr>
+          <p:nvPr>
+            <p:ph type="ftr" sz="quarter" idx="11"/>
+          </p:nvPr>
+        </p:nvSpPr>
+        <p:spPr/>
+        <p:txBody>
+          <a:bodyPr/>
+          <a:lstStyle/>
+          <a:p>
+            <a:r>
+              <a:rPr lang="en-US"/>
+              <a:t>Fedor Reznik</a:t>
+            </a:r>
+            <a:endParaRPr lang="en-US" dirty="0"/>
+          </a:p>
+        </p:txBody>
+      </p:sp>
+      <p:sp>
+        <p:nvSpPr>
+          <p:cNvPr id="8" name="Slide Number Placeholder 7">
+            <a:extLst>
+              <a:ext uri="{FF2B5EF4-FFF2-40B4-BE49-F238E27FC236}">
+                <a16:creationId xmlns:a16="http://schemas.microsoft.com/office/drawing/2014/main" id="{679EBD00-30B7-0154-BD81-E4B350A5F635}"/>
+              </a:ext>
+            </a:extLst>
+          </p:cNvPr>
+          <p:cNvSpPr>
+            <a:spLocks noGrp="1"/>
+          </p:cNvSpPr>
+          <p:nvPr>
+            <p:ph type="sldNum" sz="quarter" idx="12"/>
+          </p:nvPr>
+        </p:nvSpPr>
+        <p:spPr/>
+        <p:txBody>
+          <a:bodyPr/>
+          <a:lstStyle/>
+          <a:p>
+            <a:fld id="{3A98EE3D-8CD1-4C3F-BD1C-C98C9596463C}" type="slidenum">
+              <a:rPr lang="en-US" smtClean="0"/>
+              <a:t>7</a:t>
+            </a:fld>
+            <a:endParaRPr lang="en-US" dirty="0"/>
+          </a:p>
+        </p:txBody>
+      </p:sp>
+    </p:spTree>
+    <p:extLst>
+      <p:ext uri="{BB962C8B-B14F-4D97-AF65-F5344CB8AC3E}">
+        <p14:creationId xmlns:p14="http://schemas.microsoft.com/office/powerpoint/2010/main" val="3950098208"/>
+      </p:ext>
+    </p:extLst>
+  </p:cSld>
+  <p:clrMapOvr>
+    <a:masterClrMapping/>
+  </p:clrMapOvr>
+</p:sld>
+</file>
+
+<file path=ppt/slides/slide8.xml><?xml version="1.0" encoding="utf-8"?>
+<p:sld xmlns:a="http://schemas.openxmlformats.org/drawingml/2006/main" xmlns:r="http://schemas.openxmlformats.org/officeDocument/2006/relationships" xmlns:p="http://schemas.openxmlformats.org/presentationml/2006/main">
+  <p:cSld>
+    <p:spTree>
+      <p:nvGrpSpPr>
+        <p:cNvPr id="1" name="">
+          <a:extLst>
+            <a:ext uri="{FF2B5EF4-FFF2-40B4-BE49-F238E27FC236}">
+              <a16:creationId xmlns:a16="http://schemas.microsoft.com/office/drawing/2014/main" id="{5F102FED-1EEA-BE5D-B987-A52C6428335A}"/>
+            </a:ext>
+          </a:extLst>
+        </p:cNvPr>
+        <p:cNvGrpSpPr/>
+        <p:nvPr/>
+      </p:nvGrpSpPr>
+      <p:grpSpPr>
+        <a:xfrm>
+          <a:off x="0" y="0"/>
+          <a:ext cx="0" cy="0"/>
+          <a:chOff x="0" y="0"/>
+          <a:chExt cx="0" cy="0"/>
+        </a:xfrm>
+      </p:grpSpPr>
+      <p:sp>
+        <p:nvSpPr>
+          <p:cNvPr id="2" name="Title 1">
+            <a:extLst>
+              <a:ext uri="{FF2B5EF4-FFF2-40B4-BE49-F238E27FC236}">
+                <a16:creationId xmlns:a16="http://schemas.microsoft.com/office/drawing/2014/main" id="{2E31C1A4-97D4-BE35-4569-64FDAD67F25C}"/>
+              </a:ext>
+            </a:extLst>
+          </p:cNvPr>
+          <p:cNvSpPr>
+            <a:spLocks noGrp="1"/>
+          </p:cNvSpPr>
+          <p:nvPr>
+            <p:ph type="title"/>
+          </p:nvPr>
+        </p:nvSpPr>
+        <p:spPr>
+          <a:xfrm>
+            <a:off x="581192" y="702156"/>
+            <a:ext cx="11029616" cy="506302"/>
+          </a:xfrm>
+        </p:spPr>
+        <p:txBody>
+          <a:bodyPr>
+            <a:normAutofit fontScale="90000"/>
+          </a:bodyPr>
+          <a:lstStyle/>
+          <a:p>
+            <a:r>
+              <a:rPr lang="en-US" dirty="0"/>
+              <a:t>Moving to patterns. MVC with Routing</a:t>
+            </a:r>
+          </a:p>
+        </p:txBody>
+      </p:sp>
+      <p:sp>
+        <p:nvSpPr>
+          <p:cNvPr id="3" name="Content Placeholder 2">
+            <a:extLst>
+              <a:ext uri="{FF2B5EF4-FFF2-40B4-BE49-F238E27FC236}">
+                <a16:creationId xmlns:a16="http://schemas.microsoft.com/office/drawing/2014/main" id="{14AAEF5A-2407-946A-09D1-BA0ADBD40652}"/>
+              </a:ext>
+            </a:extLst>
+          </p:cNvPr>
+          <p:cNvSpPr>
+            <a:spLocks noGrp="1"/>
+          </p:cNvSpPr>
+          <p:nvPr>
+            <p:ph idx="1"/>
+          </p:nvPr>
+        </p:nvSpPr>
+        <p:spPr>
+          <a:xfrm>
+            <a:off x="581192" y="1596118"/>
+            <a:ext cx="11029615" cy="4720090"/>
+          </a:xfrm>
+        </p:spPr>
+        <p:txBody>
+          <a:bodyPr anchor="t"/>
+          <a:lstStyle/>
+          <a:p>
+            <a:pPr marL="0" indent="0" algn="just">
+              <a:buNone/>
+            </a:pPr>
+            <a:r>
+              <a:rPr lang="en-US" b="1" dirty="0"/>
+              <a:t>SIMPLE IMPLEMENTATION:</a:t>
+            </a:r>
+          </a:p>
+          <a:p>
+            <a:pPr algn="just"/>
+            <a:r>
+              <a:rPr lang="en-US" dirty="0"/>
+              <a:t>Router. Complexity is on DI container.</a:t>
+            </a:r>
+          </a:p>
+          <a:p>
+            <a:pPr algn="just"/>
+            <a:r>
+              <a:rPr lang="en-US" dirty="0"/>
+              <a:t>Further decoupling of Views and Controllers via Routes.</a:t>
+            </a:r>
+          </a:p>
+        </p:txBody>
+      </p:sp>
+      <p:sp>
+        <p:nvSpPr>
+          <p:cNvPr id="7" name="Footer Placeholder 6">
+            <a:extLst>
+              <a:ext uri="{FF2B5EF4-FFF2-40B4-BE49-F238E27FC236}">
+                <a16:creationId xmlns:a16="http://schemas.microsoft.com/office/drawing/2014/main" id="{E743F3D7-4501-E980-537F-B2471C936C09}"/>
+              </a:ext>
+            </a:extLst>
+          </p:cNvPr>
+          <p:cNvSpPr>
+            <a:spLocks noGrp="1"/>
+          </p:cNvSpPr>
+          <p:nvPr>
+            <p:ph type="ftr" sz="quarter" idx="11"/>
+          </p:nvPr>
+        </p:nvSpPr>
+        <p:spPr/>
+        <p:txBody>
+          <a:bodyPr/>
+          <a:lstStyle/>
+          <a:p>
+            <a:r>
+              <a:rPr lang="en-US"/>
+              <a:t>Fedor Reznik</a:t>
+            </a:r>
+            <a:endParaRPr lang="en-US" dirty="0"/>
+          </a:p>
+        </p:txBody>
+      </p:sp>
+      <p:sp>
+        <p:nvSpPr>
+          <p:cNvPr id="8" name="Slide Number Placeholder 7">
+            <a:extLst>
+              <a:ext uri="{FF2B5EF4-FFF2-40B4-BE49-F238E27FC236}">
+                <a16:creationId xmlns:a16="http://schemas.microsoft.com/office/drawing/2014/main" id="{1D7CE5AE-E15C-EB1B-F2B6-E26123B8AE6B}"/>
+              </a:ext>
+            </a:extLst>
+          </p:cNvPr>
+          <p:cNvSpPr>
+            <a:spLocks noGrp="1"/>
+          </p:cNvSpPr>
+          <p:nvPr>
+            <p:ph type="sldNum" sz="quarter" idx="12"/>
+          </p:nvPr>
+        </p:nvSpPr>
+        <p:spPr/>
+        <p:txBody>
+          <a:bodyPr/>
+          <a:lstStyle/>
+          <a:p>
+            <a:fld id="{3A98EE3D-8CD1-4C3F-BD1C-C98C9596463C}" type="slidenum">
+              <a:rPr lang="en-US" smtClean="0"/>
+              <a:t>8</a:t>
+            </a:fld>
+            <a:endParaRPr lang="en-US" dirty="0"/>
+          </a:p>
+        </p:txBody>
+      </p:sp>
+    </p:spTree>
+    <p:extLst>
+      <p:ext uri="{BB962C8B-B14F-4D97-AF65-F5344CB8AC3E}">
+        <p14:creationId xmlns:p14="http://schemas.microsoft.com/office/powerpoint/2010/main" val="1822507920"/>
+      </p:ext>
+    </p:extLst>
+  </p:cSld>
+  <p:clrMapOvr>
+    <a:masterClrMapping/>
+  </p:clrMapOvr>
+</p:sld>
+</file>
+
+<file path=ppt/slides/slide9.xml><?xml version="1.0" encoding="utf-8"?>
+<p:sld xmlns:a="http://schemas.openxmlformats.org/drawingml/2006/main" xmlns:r="http://schemas.openxmlformats.org/officeDocument/2006/relationships" xmlns:p="http://schemas.openxmlformats.org/presentationml/2006/main">
+  <p:cSld>
+    <p:spTree>
+      <p:nvGrpSpPr>
+        <p:cNvPr id="1" name="">
+          <a:extLst>
+            <a:ext uri="{FF2B5EF4-FFF2-40B4-BE49-F238E27FC236}">
+              <a16:creationId xmlns:a16="http://schemas.microsoft.com/office/drawing/2014/main" id="{B53A175C-8FD4-20CE-F093-93664ECA73AB}"/>
+            </a:ext>
+          </a:extLst>
+        </p:cNvPr>
+        <p:cNvGrpSpPr/>
+        <p:nvPr/>
+      </p:nvGrpSpPr>
+      <p:grpSpPr>
+        <a:xfrm>
+          <a:off x="0" y="0"/>
+          <a:ext cx="0" cy="0"/>
+          <a:chOff x="0" y="0"/>
+          <a:chExt cx="0" cy="0"/>
+        </a:xfrm>
+      </p:grpSpPr>
+      <p:sp>
+        <p:nvSpPr>
+          <p:cNvPr id="2" name="Title 1">
+            <a:extLst>
+              <a:ext uri="{FF2B5EF4-FFF2-40B4-BE49-F238E27FC236}">
+                <a16:creationId xmlns:a16="http://schemas.microsoft.com/office/drawing/2014/main" id="{9CB50717-CF1C-1B1A-F215-CD94F98BF761}"/>
+              </a:ext>
+            </a:extLst>
+          </p:cNvPr>
+          <p:cNvSpPr>
+            <a:spLocks noGrp="1"/>
+          </p:cNvSpPr>
+          <p:nvPr>
+            <p:ph type="title"/>
+          </p:nvPr>
+        </p:nvSpPr>
+        <p:spPr>
+          <a:xfrm>
+            <a:off x="581192" y="702156"/>
+            <a:ext cx="11029616" cy="506302"/>
+          </a:xfrm>
+        </p:spPr>
+        <p:txBody>
+          <a:bodyPr>
+            <a:normAutofit fontScale="90000"/>
+          </a:bodyPr>
+          <a:lstStyle/>
+          <a:p>
+            <a:r>
+              <a:rPr lang="en-US" dirty="0"/>
+              <a:t>Moving to patterns. MVC with Routing</a:t>
+            </a:r>
+          </a:p>
+        </p:txBody>
+      </p:sp>
+      <p:sp>
+        <p:nvSpPr>
+          <p:cNvPr id="3" name="Content Placeholder 2">
+            <a:extLst>
+              <a:ext uri="{FF2B5EF4-FFF2-40B4-BE49-F238E27FC236}">
+                <a16:creationId xmlns:a16="http://schemas.microsoft.com/office/drawing/2014/main" id="{DF0FD4DA-408F-13E1-89F8-95272947E050}"/>
+              </a:ext>
+            </a:extLst>
+          </p:cNvPr>
+          <p:cNvSpPr>
+            <a:spLocks noGrp="1"/>
+          </p:cNvSpPr>
+          <p:nvPr>
+            <p:ph idx="1"/>
+          </p:nvPr>
+        </p:nvSpPr>
+        <p:spPr>
+          <a:xfrm>
+            <a:off x="581192" y="1596118"/>
+            <a:ext cx="11029615" cy="4720090"/>
+          </a:xfrm>
+        </p:spPr>
+        <p:txBody>
+          <a:bodyPr anchor="t"/>
+          <a:lstStyle/>
+          <a:p>
+            <a:pPr marL="0" indent="0" algn="just">
+              <a:buNone/>
+            </a:pPr>
+            <a:r>
+              <a:rPr lang="en-US" b="1" dirty="0"/>
+              <a:t>OUTCOME:</a:t>
+            </a:r>
+          </a:p>
+          <a:p>
+            <a:pPr algn="just"/>
+            <a:r>
+              <a:rPr lang="en-US" dirty="0"/>
+              <a:t>Model, View and Controller are more focused on their duties.</a:t>
+            </a:r>
+          </a:p>
+          <a:p>
+            <a:pPr algn="just"/>
+            <a:r>
+              <a:rPr lang="en-US" dirty="0"/>
+              <a:t>Improved testability. Not w/o problems with mocks.</a:t>
+            </a:r>
+          </a:p>
+          <a:p>
+            <a:pPr algn="just"/>
+            <a:r>
+              <a:rPr lang="en-US" dirty="0"/>
+              <a:t>More complex scenarios are supported.</a:t>
+            </a:r>
+          </a:p>
+        </p:txBody>
+      </p:sp>
+      <p:sp>
+        <p:nvSpPr>
+          <p:cNvPr id="7" name="Footer Placeholder 6">
+            <a:extLst>
+              <a:ext uri="{FF2B5EF4-FFF2-40B4-BE49-F238E27FC236}">
+                <a16:creationId xmlns:a16="http://schemas.microsoft.com/office/drawing/2014/main" id="{5FD6DA6B-4E2C-8115-7C52-B9B35AC0A81F}"/>
+              </a:ext>
+            </a:extLst>
+          </p:cNvPr>
+          <p:cNvSpPr>
+            <a:spLocks noGrp="1"/>
+          </p:cNvSpPr>
+          <p:nvPr>
+            <p:ph type="ftr" sz="quarter" idx="11"/>
+          </p:nvPr>
+        </p:nvSpPr>
+        <p:spPr/>
+        <p:txBody>
+          <a:bodyPr/>
+          <a:lstStyle/>
+          <a:p>
+            <a:r>
+              <a:rPr lang="en-US"/>
+              <a:t>Fedor Reznik</a:t>
+            </a:r>
+            <a:endParaRPr lang="en-US" dirty="0"/>
+          </a:p>
+        </p:txBody>
+      </p:sp>
+      <p:sp>
+        <p:nvSpPr>
+          <p:cNvPr id="8" name="Slide Number Placeholder 7">
+            <a:extLst>
+              <a:ext uri="{FF2B5EF4-FFF2-40B4-BE49-F238E27FC236}">
+                <a16:creationId xmlns:a16="http://schemas.microsoft.com/office/drawing/2014/main" id="{8E8BB54B-62AB-A2B9-9D1A-420B1A88EBB5}"/>
+              </a:ext>
+            </a:extLst>
+          </p:cNvPr>
+          <p:cNvSpPr>
+            <a:spLocks noGrp="1"/>
+          </p:cNvSpPr>
+          <p:nvPr>
+            <p:ph type="sldNum" sz="quarter" idx="12"/>
+          </p:nvPr>
+        </p:nvSpPr>
+        <p:spPr/>
+        <p:txBody>
+          <a:bodyPr/>
+          <a:lstStyle/>
+          <a:p>
+            <a:fld id="{3A98EE3D-8CD1-4C3F-BD1C-C98C9596463C}" type="slidenum">
+              <a:rPr lang="en-US" smtClean="0"/>
+              <a:t>9</a:t>
+            </a:fld>
+            <a:endParaRPr lang="en-US" dirty="0"/>
+          </a:p>
+        </p:txBody>
+      </p:sp>
+    </p:spTree>
+    <p:extLst>
+      <p:ext uri="{BB962C8B-B14F-4D97-AF65-F5344CB8AC3E}">
+        <p14:creationId xmlns:p14="http://schemas.microsoft.com/office/powerpoint/2010/main" val="1291222682"/>
       </p:ext>
     </p:extLst>
   </p:cSld>

</xml_diff>